<commit_message>
Finished simulations need to then finish the plots!
</commit_message>
<xml_diff>
--- a/output/Figures/Figs.pptx
+++ b/output/Figures/Figs.pptx
@@ -5,7 +5,7 @@
     <p:sldMasterId id="2147483648" r:id="rId1"/>
   </p:sldMasterIdLst>
   <p:notesMasterIdLst>
-    <p:notesMasterId r:id="rId12"/>
+    <p:notesMasterId r:id="rId19"/>
   </p:notesMasterIdLst>
   <p:sldIdLst>
     <p:sldId id="256" r:id="rId2"/>
@@ -14,10 +14,17 @@
     <p:sldId id="261" r:id="rId5"/>
     <p:sldId id="262" r:id="rId6"/>
     <p:sldId id="260" r:id="rId7"/>
-    <p:sldId id="257" r:id="rId8"/>
-    <p:sldId id="263" r:id="rId9"/>
-    <p:sldId id="264" r:id="rId10"/>
-    <p:sldId id="265" r:id="rId11"/>
+    <p:sldId id="268" r:id="rId8"/>
+    <p:sldId id="269" r:id="rId9"/>
+    <p:sldId id="272" r:id="rId10"/>
+    <p:sldId id="270" r:id="rId11"/>
+    <p:sldId id="271" r:id="rId12"/>
+    <p:sldId id="257" r:id="rId13"/>
+    <p:sldId id="263" r:id="rId14"/>
+    <p:sldId id="266" r:id="rId15"/>
+    <p:sldId id="267" r:id="rId16"/>
+    <p:sldId id="264" r:id="rId17"/>
+    <p:sldId id="265" r:id="rId18"/>
   </p:sldIdLst>
   <p:sldSz cx="12192000" cy="6858000"/>
   <p:notesSz cx="6858000" cy="9144000"/>
@@ -206,7 +213,7 @@
           <a:p>
             <a:fld id="{F32F4F65-7D4C-48C3-BBC4-C7E0D1368BE3}" type="datetimeFigureOut">
               <a:rPr lang="en-US" smtClean="0"/>
-              <a:t>12/6/2021</a:t>
+              <a:t>1/14/2022</a:t>
             </a:fld>
             <a:endParaRPr lang="en-US"/>
           </a:p>
@@ -872,7 +879,7 @@
           <a:p>
             <a:fld id="{E05F9EE4-F6CF-43BF-807F-E37C8E7F1AC9}" type="datetimeFigureOut">
               <a:rPr lang="en-US" smtClean="0"/>
-              <a:t>12/6/2021</a:t>
+              <a:t>1/14/2022</a:t>
             </a:fld>
             <a:endParaRPr lang="en-US"/>
           </a:p>
@@ -1070,7 +1077,7 @@
           <a:p>
             <a:fld id="{E05F9EE4-F6CF-43BF-807F-E37C8E7F1AC9}" type="datetimeFigureOut">
               <a:rPr lang="en-US" smtClean="0"/>
-              <a:t>12/6/2021</a:t>
+              <a:t>1/14/2022</a:t>
             </a:fld>
             <a:endParaRPr lang="en-US"/>
           </a:p>
@@ -1278,7 +1285,7 @@
           <a:p>
             <a:fld id="{E05F9EE4-F6CF-43BF-807F-E37C8E7F1AC9}" type="datetimeFigureOut">
               <a:rPr lang="en-US" smtClean="0"/>
-              <a:t>12/6/2021</a:t>
+              <a:t>1/14/2022</a:t>
             </a:fld>
             <a:endParaRPr lang="en-US"/>
           </a:p>
@@ -1476,7 +1483,7 @@
           <a:p>
             <a:fld id="{E05F9EE4-F6CF-43BF-807F-E37C8E7F1AC9}" type="datetimeFigureOut">
               <a:rPr lang="en-US" smtClean="0"/>
-              <a:t>12/6/2021</a:t>
+              <a:t>1/14/2022</a:t>
             </a:fld>
             <a:endParaRPr lang="en-US"/>
           </a:p>
@@ -1751,7 +1758,7 @@
           <a:p>
             <a:fld id="{E05F9EE4-F6CF-43BF-807F-E37C8E7F1AC9}" type="datetimeFigureOut">
               <a:rPr lang="en-US" smtClean="0"/>
-              <a:t>12/6/2021</a:t>
+              <a:t>1/14/2022</a:t>
             </a:fld>
             <a:endParaRPr lang="en-US"/>
           </a:p>
@@ -2016,7 +2023,7 @@
           <a:p>
             <a:fld id="{E05F9EE4-F6CF-43BF-807F-E37C8E7F1AC9}" type="datetimeFigureOut">
               <a:rPr lang="en-US" smtClean="0"/>
-              <a:t>12/6/2021</a:t>
+              <a:t>1/14/2022</a:t>
             </a:fld>
             <a:endParaRPr lang="en-US"/>
           </a:p>
@@ -2428,7 +2435,7 @@
           <a:p>
             <a:fld id="{E05F9EE4-F6CF-43BF-807F-E37C8E7F1AC9}" type="datetimeFigureOut">
               <a:rPr lang="en-US" smtClean="0"/>
-              <a:t>12/6/2021</a:t>
+              <a:t>1/14/2022</a:t>
             </a:fld>
             <a:endParaRPr lang="en-US"/>
           </a:p>
@@ -2569,7 +2576,7 @@
           <a:p>
             <a:fld id="{E05F9EE4-F6CF-43BF-807F-E37C8E7F1AC9}" type="datetimeFigureOut">
               <a:rPr lang="en-US" smtClean="0"/>
-              <a:t>12/6/2021</a:t>
+              <a:t>1/14/2022</a:t>
             </a:fld>
             <a:endParaRPr lang="en-US"/>
           </a:p>
@@ -2682,7 +2689,7 @@
           <a:p>
             <a:fld id="{E05F9EE4-F6CF-43BF-807F-E37C8E7F1AC9}" type="datetimeFigureOut">
               <a:rPr lang="en-US" smtClean="0"/>
-              <a:t>12/6/2021</a:t>
+              <a:t>1/14/2022</a:t>
             </a:fld>
             <a:endParaRPr lang="en-US"/>
           </a:p>
@@ -2993,7 +3000,7 @@
           <a:p>
             <a:fld id="{E05F9EE4-F6CF-43BF-807F-E37C8E7F1AC9}" type="datetimeFigureOut">
               <a:rPr lang="en-US" smtClean="0"/>
-              <a:t>12/6/2021</a:t>
+              <a:t>1/14/2022</a:t>
             </a:fld>
             <a:endParaRPr lang="en-US"/>
           </a:p>
@@ -3281,7 +3288,7 @@
           <a:p>
             <a:fld id="{E05F9EE4-F6CF-43BF-807F-E37C8E7F1AC9}" type="datetimeFigureOut">
               <a:rPr lang="en-US" smtClean="0"/>
-              <a:t>12/6/2021</a:t>
+              <a:t>1/14/2022</a:t>
             </a:fld>
             <a:endParaRPr lang="en-US"/>
           </a:p>
@@ -3522,7 +3529,7 @@
           <a:p>
             <a:fld id="{E05F9EE4-F6CF-43BF-807F-E37C8E7F1AC9}" type="datetimeFigureOut">
               <a:rPr lang="en-US" smtClean="0"/>
-              <a:t>12/6/2021</a:t>
+              <a:t>1/14/2022</a:t>
             </a:fld>
             <a:endParaRPr lang="en-US"/>
           </a:p>
@@ -4171,6 +4178,2397 @@
 </file>
 
 <file path=ppt/slides/slide10.xml><?xml version="1.0" encoding="utf-8"?>
+<p:sld xmlns:a="http://schemas.openxmlformats.org/drawingml/2006/main" xmlns:r="http://schemas.openxmlformats.org/officeDocument/2006/relationships" xmlns:p="http://schemas.openxmlformats.org/presentationml/2006/main">
+  <p:cSld>
+    <p:spTree>
+      <p:nvGrpSpPr>
+        <p:cNvPr id="1" name=""/>
+        <p:cNvGrpSpPr/>
+        <p:nvPr/>
+      </p:nvGrpSpPr>
+      <p:grpSpPr>
+        <a:xfrm>
+          <a:off x="0" y="0"/>
+          <a:ext cx="0" cy="0"/>
+          <a:chOff x="0" y="0"/>
+          <a:chExt cx="0" cy="0"/>
+        </a:xfrm>
+      </p:grpSpPr>
+      <p:pic>
+        <p:nvPicPr>
+          <p:cNvPr id="3" name="Picture 2" descr="Chart&#10;&#10;Description automatically generated">
+            <a:extLst>
+              <a:ext uri="{FF2B5EF4-FFF2-40B4-BE49-F238E27FC236}">
+                <a16:creationId xmlns:a16="http://schemas.microsoft.com/office/drawing/2014/main" id="{F9057353-9A5B-40E6-83AF-E82B3CB90FCE}"/>
+              </a:ext>
+            </a:extLst>
+          </p:cNvPr>
+          <p:cNvPicPr>
+            <a:picLocks noChangeAspect="1"/>
+          </p:cNvPicPr>
+          <p:nvPr/>
+        </p:nvPicPr>
+        <p:blipFill>
+          <a:blip r:embed="rId2">
+            <a:extLst>
+              <a:ext uri="{28A0092B-C50C-407E-A947-70E740481C1C}">
+                <a14:useLocalDpi xmlns:a14="http://schemas.microsoft.com/office/drawing/2010/main" val="0"/>
+              </a:ext>
+            </a:extLst>
+          </a:blip>
+          <a:stretch>
+            <a:fillRect/>
+          </a:stretch>
+        </p:blipFill>
+        <p:spPr>
+          <a:xfrm>
+            <a:off x="3809995" y="1600196"/>
+            <a:ext cx="4572009" cy="3657607"/>
+          </a:xfrm>
+          <a:prstGeom prst="rect">
+            <a:avLst/>
+          </a:prstGeom>
+        </p:spPr>
+      </p:pic>
+      <p:pic>
+        <p:nvPicPr>
+          <p:cNvPr id="5" name="Picture 4" descr="Chart&#10;&#10;Description automatically generated">
+            <a:extLst>
+              <a:ext uri="{FF2B5EF4-FFF2-40B4-BE49-F238E27FC236}">
+                <a16:creationId xmlns:a16="http://schemas.microsoft.com/office/drawing/2014/main" id="{1DF74326-A556-4A09-BF94-59543054C932}"/>
+              </a:ext>
+            </a:extLst>
+          </p:cNvPr>
+          <p:cNvPicPr>
+            <a:picLocks noChangeAspect="1"/>
+          </p:cNvPicPr>
+          <p:nvPr/>
+        </p:nvPicPr>
+        <p:blipFill>
+          <a:blip r:embed="rId3">
+            <a:extLst>
+              <a:ext uri="{28A0092B-C50C-407E-A947-70E740481C1C}">
+                <a14:useLocalDpi xmlns:a14="http://schemas.microsoft.com/office/drawing/2010/main" val="0"/>
+              </a:ext>
+            </a:extLst>
+          </a:blip>
+          <a:stretch>
+            <a:fillRect/>
+          </a:stretch>
+        </p:blipFill>
+        <p:spPr>
+          <a:xfrm>
+            <a:off x="3959995" y="1750196"/>
+            <a:ext cx="4572009" cy="3657607"/>
+          </a:xfrm>
+          <a:prstGeom prst="rect">
+            <a:avLst/>
+          </a:prstGeom>
+        </p:spPr>
+      </p:pic>
+      <p:pic>
+        <p:nvPicPr>
+          <p:cNvPr id="7" name="Picture 6" descr="Chart&#10;&#10;Description automatically generated">
+            <a:extLst>
+              <a:ext uri="{FF2B5EF4-FFF2-40B4-BE49-F238E27FC236}">
+                <a16:creationId xmlns:a16="http://schemas.microsoft.com/office/drawing/2014/main" id="{DDC96B18-C5D9-46BC-9FF6-D42D7027B458}"/>
+              </a:ext>
+            </a:extLst>
+          </p:cNvPr>
+          <p:cNvPicPr>
+            <a:picLocks noChangeAspect="1"/>
+          </p:cNvPicPr>
+          <p:nvPr/>
+        </p:nvPicPr>
+        <p:blipFill>
+          <a:blip r:embed="rId4">
+            <a:extLst>
+              <a:ext uri="{28A0092B-C50C-407E-A947-70E740481C1C}">
+                <a14:useLocalDpi xmlns:a14="http://schemas.microsoft.com/office/drawing/2010/main" val="0"/>
+              </a:ext>
+            </a:extLst>
+          </a:blip>
+          <a:stretch>
+            <a:fillRect/>
+          </a:stretch>
+        </p:blipFill>
+        <p:spPr>
+          <a:xfrm>
+            <a:off x="4109995" y="1900196"/>
+            <a:ext cx="4572009" cy="3657607"/>
+          </a:xfrm>
+          <a:prstGeom prst="rect">
+            <a:avLst/>
+          </a:prstGeom>
+        </p:spPr>
+      </p:pic>
+      <p:pic>
+        <p:nvPicPr>
+          <p:cNvPr id="9" name="Picture 8" descr="Chart&#10;&#10;Description automatically generated">
+            <a:extLst>
+              <a:ext uri="{FF2B5EF4-FFF2-40B4-BE49-F238E27FC236}">
+                <a16:creationId xmlns:a16="http://schemas.microsoft.com/office/drawing/2014/main" id="{19F85957-5089-4094-8FB0-63E09475AD48}"/>
+              </a:ext>
+            </a:extLst>
+          </p:cNvPr>
+          <p:cNvPicPr>
+            <a:picLocks noChangeAspect="1"/>
+          </p:cNvPicPr>
+          <p:nvPr/>
+        </p:nvPicPr>
+        <p:blipFill>
+          <a:blip r:embed="rId5">
+            <a:extLst>
+              <a:ext uri="{28A0092B-C50C-407E-A947-70E740481C1C}">
+                <a14:useLocalDpi xmlns:a14="http://schemas.microsoft.com/office/drawing/2010/main" val="0"/>
+              </a:ext>
+            </a:extLst>
+          </a:blip>
+          <a:stretch>
+            <a:fillRect/>
+          </a:stretch>
+        </p:blipFill>
+        <p:spPr>
+          <a:xfrm>
+            <a:off x="4259995" y="2050196"/>
+            <a:ext cx="4572009" cy="3657607"/>
+          </a:xfrm>
+          <a:prstGeom prst="rect">
+            <a:avLst/>
+          </a:prstGeom>
+        </p:spPr>
+      </p:pic>
+    </p:spTree>
+    <p:extLst>
+      <p:ext uri="{BB962C8B-B14F-4D97-AF65-F5344CB8AC3E}">
+        <p14:creationId xmlns:p14="http://schemas.microsoft.com/office/powerpoint/2010/main" val="1915133092"/>
+      </p:ext>
+    </p:extLst>
+  </p:cSld>
+  <p:clrMapOvr>
+    <a:masterClrMapping/>
+  </p:clrMapOvr>
+</p:sld>
+</file>
+
+<file path=ppt/slides/slide11.xml><?xml version="1.0" encoding="utf-8"?>
+<p:sld xmlns:a="http://schemas.openxmlformats.org/drawingml/2006/main" xmlns:r="http://schemas.openxmlformats.org/officeDocument/2006/relationships" xmlns:p="http://schemas.openxmlformats.org/presentationml/2006/main">
+  <p:cSld>
+    <p:spTree>
+      <p:nvGrpSpPr>
+        <p:cNvPr id="1" name=""/>
+        <p:cNvGrpSpPr/>
+        <p:nvPr/>
+      </p:nvGrpSpPr>
+      <p:grpSpPr>
+        <a:xfrm>
+          <a:off x="0" y="0"/>
+          <a:ext cx="0" cy="0"/>
+          <a:chOff x="0" y="0"/>
+          <a:chExt cx="0" cy="0"/>
+        </a:xfrm>
+      </p:grpSpPr>
+      <p:pic>
+        <p:nvPicPr>
+          <p:cNvPr id="5" name="Picture 4" descr="Chart, box and whisker chart&#10;&#10;Description automatically generated">
+            <a:extLst>
+              <a:ext uri="{FF2B5EF4-FFF2-40B4-BE49-F238E27FC236}">
+                <a16:creationId xmlns:a16="http://schemas.microsoft.com/office/drawing/2014/main" id="{040ECF0C-04E1-458B-A3B9-1F12EA5EBDF1}"/>
+              </a:ext>
+            </a:extLst>
+          </p:cNvPr>
+          <p:cNvPicPr>
+            <a:picLocks noChangeAspect="1"/>
+          </p:cNvPicPr>
+          <p:nvPr/>
+        </p:nvPicPr>
+        <p:blipFill>
+          <a:blip r:embed="rId2">
+            <a:extLst>
+              <a:ext uri="{28A0092B-C50C-407E-A947-70E740481C1C}">
+                <a14:useLocalDpi xmlns:a14="http://schemas.microsoft.com/office/drawing/2010/main" val="0"/>
+              </a:ext>
+            </a:extLst>
+          </a:blip>
+          <a:stretch>
+            <a:fillRect/>
+          </a:stretch>
+        </p:blipFill>
+        <p:spPr>
+          <a:xfrm>
+            <a:off x="1523990" y="1142995"/>
+            <a:ext cx="9144019" cy="4572009"/>
+          </a:xfrm>
+          <a:prstGeom prst="rect">
+            <a:avLst/>
+          </a:prstGeom>
+        </p:spPr>
+      </p:pic>
+    </p:spTree>
+    <p:extLst>
+      <p:ext uri="{BB962C8B-B14F-4D97-AF65-F5344CB8AC3E}">
+        <p14:creationId xmlns:p14="http://schemas.microsoft.com/office/powerpoint/2010/main" val="1940379294"/>
+      </p:ext>
+    </p:extLst>
+  </p:cSld>
+  <p:clrMapOvr>
+    <a:masterClrMapping/>
+  </p:clrMapOvr>
+</p:sld>
+</file>
+
+<file path=ppt/slides/slide12.xml><?xml version="1.0" encoding="utf-8"?>
+<p:sld xmlns:a="http://schemas.openxmlformats.org/drawingml/2006/main" xmlns:r="http://schemas.openxmlformats.org/officeDocument/2006/relationships" xmlns:p="http://schemas.openxmlformats.org/presentationml/2006/main">
+  <p:cSld>
+    <p:spTree>
+      <p:nvGrpSpPr>
+        <p:cNvPr id="1" name=""/>
+        <p:cNvGrpSpPr/>
+        <p:nvPr/>
+      </p:nvGrpSpPr>
+      <p:grpSpPr>
+        <a:xfrm>
+          <a:off x="0" y="0"/>
+          <a:ext cx="0" cy="0"/>
+          <a:chOff x="0" y="0"/>
+          <a:chExt cx="0" cy="0"/>
+        </a:xfrm>
+      </p:grpSpPr>
+      <p:grpSp>
+        <p:nvGrpSpPr>
+          <p:cNvPr id="10" name="Group 9">
+            <a:extLst>
+              <a:ext uri="{FF2B5EF4-FFF2-40B4-BE49-F238E27FC236}">
+                <a16:creationId xmlns:a16="http://schemas.microsoft.com/office/drawing/2014/main" id="{B80A4323-15A7-43E2-B1F0-9C1A4F5FA670}"/>
+              </a:ext>
+            </a:extLst>
+          </p:cNvPr>
+          <p:cNvGrpSpPr/>
+          <p:nvPr/>
+        </p:nvGrpSpPr>
+        <p:grpSpPr>
+          <a:xfrm>
+            <a:off x="71047" y="0"/>
+            <a:ext cx="8197158" cy="6858000"/>
+            <a:chOff x="71047" y="0"/>
+            <a:chExt cx="8197158" cy="6858000"/>
+          </a:xfrm>
+        </p:grpSpPr>
+        <p:pic>
+          <p:nvPicPr>
+            <p:cNvPr id="7" name="Picture 6" descr="Shape&#10;&#10;Description automatically generated">
+              <a:extLst>
+                <a:ext uri="{FF2B5EF4-FFF2-40B4-BE49-F238E27FC236}">
+                  <a16:creationId xmlns:a16="http://schemas.microsoft.com/office/drawing/2014/main" id="{B5E2B5A2-E21C-4BB3-91E0-447126E9FCFF}"/>
+                </a:ext>
+              </a:extLst>
+            </p:cNvPr>
+            <p:cNvPicPr>
+              <a:picLocks noChangeAspect="1"/>
+            </p:cNvPicPr>
+            <p:nvPr/>
+          </p:nvPicPr>
+          <p:blipFill>
+            <a:blip r:embed="rId2">
+              <a:extLst>
+                <a:ext uri="{28A0092B-C50C-407E-A947-70E740481C1C}">
+                  <a14:useLocalDpi xmlns:a14="http://schemas.microsoft.com/office/drawing/2010/main" val="0"/>
+                </a:ext>
+              </a:extLst>
+            </a:blip>
+            <a:stretch>
+              <a:fillRect/>
+            </a:stretch>
+          </p:blipFill>
+          <p:spPr>
+            <a:xfrm>
+              <a:off x="71047" y="2697755"/>
+              <a:ext cx="4160245" cy="4160245"/>
+            </a:xfrm>
+            <a:prstGeom prst="rect">
+              <a:avLst/>
+            </a:prstGeom>
+          </p:spPr>
+        </p:pic>
+        <p:pic>
+          <p:nvPicPr>
+            <p:cNvPr id="5" name="Picture 4" descr="Chart&#10;&#10;Description automatically generated">
+              <a:extLst>
+                <a:ext uri="{FF2B5EF4-FFF2-40B4-BE49-F238E27FC236}">
+                  <a16:creationId xmlns:a16="http://schemas.microsoft.com/office/drawing/2014/main" id="{62212AF3-1643-4B8E-ACA4-A40C6C4015DB}"/>
+                </a:ext>
+              </a:extLst>
+            </p:cNvPr>
+            <p:cNvPicPr>
+              <a:picLocks noChangeAspect="1"/>
+            </p:cNvPicPr>
+            <p:nvPr/>
+          </p:nvPicPr>
+          <p:blipFill rotWithShape="1">
+            <a:blip r:embed="rId3">
+              <a:extLst>
+                <a:ext uri="{28A0092B-C50C-407E-A947-70E740481C1C}">
+                  <a14:useLocalDpi xmlns:a14="http://schemas.microsoft.com/office/drawing/2010/main" val="0"/>
+                </a:ext>
+              </a:extLst>
+            </a:blip>
+            <a:srcRect t="18260" r="21074" b="20630"/>
+            <a:stretch/>
+          </p:blipFill>
+          <p:spPr>
+            <a:xfrm>
+              <a:off x="71047" y="0"/>
+              <a:ext cx="3858430" cy="2987420"/>
+            </a:xfrm>
+            <a:prstGeom prst="rect">
+              <a:avLst/>
+            </a:prstGeom>
+          </p:spPr>
+        </p:pic>
+        <p:pic>
+          <p:nvPicPr>
+            <p:cNvPr id="9" name="Picture 8" descr="Chart, bar chart&#10;&#10;Description automatically generated">
+              <a:extLst>
+                <a:ext uri="{FF2B5EF4-FFF2-40B4-BE49-F238E27FC236}">
+                  <a16:creationId xmlns:a16="http://schemas.microsoft.com/office/drawing/2014/main" id="{3F2BA2C2-436E-40A8-A450-829600676AE7}"/>
+                </a:ext>
+              </a:extLst>
+            </p:cNvPr>
+            <p:cNvPicPr>
+              <a:picLocks noChangeAspect="1"/>
+            </p:cNvPicPr>
+            <p:nvPr/>
+          </p:nvPicPr>
+          <p:blipFill>
+            <a:blip r:embed="rId4">
+              <a:extLst>
+                <a:ext uri="{28A0092B-C50C-407E-A947-70E740481C1C}">
+                  <a14:useLocalDpi xmlns:a14="http://schemas.microsoft.com/office/drawing/2010/main" val="0"/>
+                </a:ext>
+              </a:extLst>
+            </a:blip>
+            <a:stretch>
+              <a:fillRect/>
+            </a:stretch>
+          </p:blipFill>
+          <p:spPr>
+            <a:xfrm>
+              <a:off x="4091151" y="151940"/>
+              <a:ext cx="4177054" cy="4177054"/>
+            </a:xfrm>
+            <a:prstGeom prst="rect">
+              <a:avLst/>
+            </a:prstGeom>
+          </p:spPr>
+        </p:pic>
+      </p:grpSp>
+      <p:pic>
+        <p:nvPicPr>
+          <p:cNvPr id="3" name="Picture 2" descr="Chart, shape&#10;&#10;Description automatically generated">
+            <a:extLst>
+              <a:ext uri="{FF2B5EF4-FFF2-40B4-BE49-F238E27FC236}">
+                <a16:creationId xmlns:a16="http://schemas.microsoft.com/office/drawing/2014/main" id="{48070633-C0F3-47AD-949F-E9885420C3E3}"/>
+              </a:ext>
+            </a:extLst>
+          </p:cNvPr>
+          <p:cNvPicPr>
+            <a:picLocks noChangeAspect="1"/>
+          </p:cNvPicPr>
+          <p:nvPr/>
+        </p:nvPicPr>
+        <p:blipFill rotWithShape="1">
+          <a:blip r:embed="rId5">
+            <a:extLst>
+              <a:ext uri="{28A0092B-C50C-407E-A947-70E740481C1C}">
+                <a14:useLocalDpi xmlns:a14="http://schemas.microsoft.com/office/drawing/2010/main" val="0"/>
+              </a:ext>
+            </a:extLst>
+          </a:blip>
+          <a:srcRect t="9622"/>
+          <a:stretch/>
+        </p:blipFill>
+        <p:spPr>
+          <a:xfrm>
+            <a:off x="8358634" y="-166079"/>
+            <a:ext cx="2479007" cy="2240467"/>
+          </a:xfrm>
+          <a:prstGeom prst="rect">
+            <a:avLst/>
+          </a:prstGeom>
+        </p:spPr>
+      </p:pic>
+    </p:spTree>
+    <p:extLst>
+      <p:ext uri="{BB962C8B-B14F-4D97-AF65-F5344CB8AC3E}">
+        <p14:creationId xmlns:p14="http://schemas.microsoft.com/office/powerpoint/2010/main" val="2037376003"/>
+      </p:ext>
+    </p:extLst>
+  </p:cSld>
+  <p:clrMapOvr>
+    <a:masterClrMapping/>
+  </p:clrMapOvr>
+</p:sld>
+</file>
+
+<file path=ppt/slides/slide13.xml><?xml version="1.0" encoding="utf-8"?>
+<p:sld xmlns:a="http://schemas.openxmlformats.org/drawingml/2006/main" xmlns:r="http://schemas.openxmlformats.org/officeDocument/2006/relationships" xmlns:p="http://schemas.openxmlformats.org/presentationml/2006/main">
+  <p:cSld>
+    <p:spTree>
+      <p:nvGrpSpPr>
+        <p:cNvPr id="1" name=""/>
+        <p:cNvGrpSpPr/>
+        <p:nvPr/>
+      </p:nvGrpSpPr>
+      <p:grpSpPr>
+        <a:xfrm>
+          <a:off x="0" y="0"/>
+          <a:ext cx="0" cy="0"/>
+          <a:chOff x="0" y="0"/>
+          <a:chExt cx="0" cy="0"/>
+        </a:xfrm>
+      </p:grpSpPr>
+      <p:grpSp>
+        <p:nvGrpSpPr>
+          <p:cNvPr id="24" name="Group 23">
+            <a:extLst>
+              <a:ext uri="{FF2B5EF4-FFF2-40B4-BE49-F238E27FC236}">
+                <a16:creationId xmlns:a16="http://schemas.microsoft.com/office/drawing/2014/main" id="{FDA38EA0-E292-4FD6-922B-9E7AD7B5ED44}"/>
+              </a:ext>
+            </a:extLst>
+          </p:cNvPr>
+          <p:cNvGrpSpPr/>
+          <p:nvPr/>
+        </p:nvGrpSpPr>
+        <p:grpSpPr>
+          <a:xfrm>
+            <a:off x="1113844" y="-3311613"/>
+            <a:ext cx="6830111" cy="17114124"/>
+            <a:chOff x="1113844" y="-3311613"/>
+            <a:chExt cx="6830111" cy="17114124"/>
+          </a:xfrm>
+        </p:grpSpPr>
+        <p:pic>
+          <p:nvPicPr>
+            <p:cNvPr id="7" name="Picture 6" descr="Shape&#10;&#10;Description automatically generated">
+              <a:extLst>
+                <a:ext uri="{FF2B5EF4-FFF2-40B4-BE49-F238E27FC236}">
+                  <a16:creationId xmlns:a16="http://schemas.microsoft.com/office/drawing/2014/main" id="{CF73D72A-8976-4B04-BA4A-E23C2D4E731D}"/>
+                </a:ext>
+              </a:extLst>
+            </p:cNvPr>
+            <p:cNvPicPr>
+              <a:picLocks noChangeAspect="1"/>
+            </p:cNvPicPr>
+            <p:nvPr/>
+          </p:nvPicPr>
+          <p:blipFill rotWithShape="1">
+            <a:blip r:embed="rId2">
+              <a:extLst>
+                <a:ext uri="{28A0092B-C50C-407E-A947-70E740481C1C}">
+                  <a14:useLocalDpi xmlns:a14="http://schemas.microsoft.com/office/drawing/2010/main" val="0"/>
+                </a:ext>
+              </a:extLst>
+            </a:blip>
+            <a:srcRect r="14451"/>
+            <a:stretch/>
+          </p:blipFill>
+          <p:spPr>
+            <a:xfrm>
+              <a:off x="1149106" y="-3311613"/>
+              <a:ext cx="5202267" cy="6081029"/>
+            </a:xfrm>
+            <a:prstGeom prst="rect">
+              <a:avLst/>
+            </a:prstGeom>
+          </p:spPr>
+        </p:pic>
+        <p:pic>
+          <p:nvPicPr>
+            <p:cNvPr id="10" name="Picture 9" descr="Shape&#10;&#10;Description automatically generated">
+              <a:extLst>
+                <a:ext uri="{FF2B5EF4-FFF2-40B4-BE49-F238E27FC236}">
+                  <a16:creationId xmlns:a16="http://schemas.microsoft.com/office/drawing/2014/main" id="{D4B8190B-DF2E-4153-889F-EDDB1A5A808F}"/>
+                </a:ext>
+              </a:extLst>
+            </p:cNvPr>
+            <p:cNvPicPr>
+              <a:picLocks noChangeAspect="1"/>
+            </p:cNvPicPr>
+            <p:nvPr/>
+          </p:nvPicPr>
+          <p:blipFill rotWithShape="1">
+            <a:blip r:embed="rId3">
+              <a:extLst>
+                <a:ext uri="{28A0092B-C50C-407E-A947-70E740481C1C}">
+                  <a14:useLocalDpi xmlns:a14="http://schemas.microsoft.com/office/drawing/2010/main" val="0"/>
+                </a:ext>
+              </a:extLst>
+            </a:blip>
+            <a:srcRect t="9292" r="13266" b="16139"/>
+            <a:stretch/>
+          </p:blipFill>
+          <p:spPr>
+            <a:xfrm>
+              <a:off x="1144242" y="2285600"/>
+              <a:ext cx="5318342" cy="4572400"/>
+            </a:xfrm>
+            <a:prstGeom prst="rect">
+              <a:avLst/>
+            </a:prstGeom>
+          </p:spPr>
+        </p:pic>
+        <p:pic>
+          <p:nvPicPr>
+            <p:cNvPr id="12" name="Picture 11" descr="Chart, bar chart&#10;&#10;Description automatically generated">
+              <a:extLst>
+                <a:ext uri="{FF2B5EF4-FFF2-40B4-BE49-F238E27FC236}">
+                  <a16:creationId xmlns:a16="http://schemas.microsoft.com/office/drawing/2014/main" id="{AFBD0492-BE67-4CE6-B7B4-CD45722F61B7}"/>
+                </a:ext>
+              </a:extLst>
+            </p:cNvPr>
+            <p:cNvPicPr>
+              <a:picLocks noChangeAspect="1"/>
+            </p:cNvPicPr>
+            <p:nvPr/>
+          </p:nvPicPr>
+          <p:blipFill rotWithShape="1">
+            <a:blip r:embed="rId4">
+              <a:extLst>
+                <a:ext uri="{28A0092B-C50C-407E-A947-70E740481C1C}">
+                  <a14:useLocalDpi xmlns:a14="http://schemas.microsoft.com/office/drawing/2010/main" val="0"/>
+                </a:ext>
+              </a:extLst>
+            </a:blip>
+            <a:srcRect t="1179" r="20124"/>
+            <a:stretch/>
+          </p:blipFill>
+          <p:spPr>
+            <a:xfrm>
+              <a:off x="1113844" y="7322818"/>
+              <a:ext cx="5237529" cy="6479693"/>
+            </a:xfrm>
+            <a:prstGeom prst="rect">
+              <a:avLst/>
+            </a:prstGeom>
+          </p:spPr>
+        </p:pic>
+        <p:sp>
+          <p:nvSpPr>
+            <p:cNvPr id="14" name="Rectangle 13">
+              <a:extLst>
+                <a:ext uri="{FF2B5EF4-FFF2-40B4-BE49-F238E27FC236}">
+                  <a16:creationId xmlns:a16="http://schemas.microsoft.com/office/drawing/2014/main" id="{910149E6-9285-4B73-BC64-B0B9EBFDEE6D}"/>
+                </a:ext>
+              </a:extLst>
+            </p:cNvPr>
+            <p:cNvSpPr/>
+            <p:nvPr/>
+          </p:nvSpPr>
+          <p:spPr>
+            <a:xfrm>
+              <a:off x="1911177" y="6870353"/>
+              <a:ext cx="4307181" cy="508769"/>
+            </a:xfrm>
+            <a:prstGeom prst="rect">
+              <a:avLst/>
+            </a:prstGeom>
+            <a:solidFill>
+              <a:srgbClr val="81A1B1"/>
+            </a:solidFill>
+            <a:ln>
+              <a:solidFill>
+                <a:schemeClr val="bg1"/>
+              </a:solidFill>
+            </a:ln>
+          </p:spPr>
+          <p:style>
+            <a:lnRef idx="2">
+              <a:schemeClr val="accent1">
+                <a:shade val="50000"/>
+              </a:schemeClr>
+            </a:lnRef>
+            <a:fillRef idx="1">
+              <a:schemeClr val="accent1"/>
+            </a:fillRef>
+            <a:effectRef idx="0">
+              <a:schemeClr val="accent1"/>
+            </a:effectRef>
+            <a:fontRef idx="minor">
+              <a:schemeClr val="lt1"/>
+            </a:fontRef>
+          </p:style>
+          <p:txBody>
+            <a:bodyPr rtlCol="0" anchor="ctr"/>
+            <a:lstStyle/>
+            <a:p>
+              <a:pPr algn="ctr"/>
+              <a:r>
+                <a:rPr lang="en-US" b="1" dirty="0">
+                  <a:solidFill>
+                    <a:schemeClr val="tx1"/>
+                  </a:solidFill>
+                </a:rPr>
+                <a:t>Lambda Slope over initial 20 years</a:t>
+              </a:r>
+            </a:p>
+          </p:txBody>
+        </p:sp>
+        <p:sp>
+          <p:nvSpPr>
+            <p:cNvPr id="15" name="Rectangle 14">
+              <a:extLst>
+                <a:ext uri="{FF2B5EF4-FFF2-40B4-BE49-F238E27FC236}">
+                  <a16:creationId xmlns:a16="http://schemas.microsoft.com/office/drawing/2014/main" id="{8AA17C0F-344A-4CD0-8DB7-A30DB199043B}"/>
+                </a:ext>
+              </a:extLst>
+            </p:cNvPr>
+            <p:cNvSpPr/>
+            <p:nvPr/>
+          </p:nvSpPr>
+          <p:spPr>
+            <a:xfrm>
+              <a:off x="1911177" y="1770820"/>
+              <a:ext cx="4307181" cy="508769"/>
+            </a:xfrm>
+            <a:prstGeom prst="rect">
+              <a:avLst/>
+            </a:prstGeom>
+            <a:solidFill>
+              <a:srgbClr val="81A1B1"/>
+            </a:solidFill>
+            <a:ln>
+              <a:solidFill>
+                <a:schemeClr val="bg1"/>
+              </a:solidFill>
+            </a:ln>
+          </p:spPr>
+          <p:style>
+            <a:lnRef idx="2">
+              <a:schemeClr val="accent1">
+                <a:shade val="50000"/>
+              </a:schemeClr>
+            </a:lnRef>
+            <a:fillRef idx="1">
+              <a:schemeClr val="accent1"/>
+            </a:fillRef>
+            <a:effectRef idx="0">
+              <a:schemeClr val="accent1"/>
+            </a:effectRef>
+            <a:fontRef idx="minor">
+              <a:schemeClr val="lt1"/>
+            </a:fontRef>
+          </p:style>
+          <p:txBody>
+            <a:bodyPr rtlCol="0" anchor="ctr"/>
+            <a:lstStyle/>
+            <a:p>
+              <a:pPr algn="ctr"/>
+              <a:r>
+                <a:rPr lang="en-US" b="1" dirty="0">
+                  <a:solidFill>
+                    <a:schemeClr val="tx1"/>
+                  </a:solidFill>
+                </a:rPr>
+                <a:t>Harvest Slope over initial 20 years</a:t>
+              </a:r>
+            </a:p>
+          </p:txBody>
+        </p:sp>
+        <p:sp>
+          <p:nvSpPr>
+            <p:cNvPr id="16" name="Rectangle 15">
+              <a:extLst>
+                <a:ext uri="{FF2B5EF4-FFF2-40B4-BE49-F238E27FC236}">
+                  <a16:creationId xmlns:a16="http://schemas.microsoft.com/office/drawing/2014/main" id="{129E80C1-1F2B-49FD-B2ED-448242E8A737}"/>
+                </a:ext>
+              </a:extLst>
+            </p:cNvPr>
+            <p:cNvSpPr/>
+            <p:nvPr/>
+          </p:nvSpPr>
+          <p:spPr>
+            <a:xfrm>
+              <a:off x="1911177" y="-3254280"/>
+              <a:ext cx="4307181" cy="508769"/>
+            </a:xfrm>
+            <a:prstGeom prst="rect">
+              <a:avLst/>
+            </a:prstGeom>
+            <a:solidFill>
+              <a:srgbClr val="81A1B1"/>
+            </a:solidFill>
+            <a:ln>
+              <a:solidFill>
+                <a:schemeClr val="bg1"/>
+              </a:solidFill>
+            </a:ln>
+          </p:spPr>
+          <p:style>
+            <a:lnRef idx="2">
+              <a:schemeClr val="accent1">
+                <a:shade val="50000"/>
+              </a:schemeClr>
+            </a:lnRef>
+            <a:fillRef idx="1">
+              <a:schemeClr val="accent1"/>
+            </a:fillRef>
+            <a:effectRef idx="0">
+              <a:schemeClr val="accent1"/>
+            </a:effectRef>
+            <a:fontRef idx="minor">
+              <a:schemeClr val="lt1"/>
+            </a:fontRef>
+          </p:style>
+          <p:txBody>
+            <a:bodyPr rtlCol="0" anchor="ctr"/>
+            <a:lstStyle/>
+            <a:p>
+              <a:pPr algn="ctr"/>
+              <a:r>
+                <a:rPr lang="en-US" b="1" dirty="0">
+                  <a:solidFill>
+                    <a:schemeClr val="tx1"/>
+                  </a:solidFill>
+                </a:rPr>
+                <a:t>Fish Population Slope over initial 20 years</a:t>
+              </a:r>
+            </a:p>
+          </p:txBody>
+        </p:sp>
+        <p:pic>
+          <p:nvPicPr>
+            <p:cNvPr id="17" name="Picture 16" descr="Chart, bar chart&#10;&#10;Description automatically generated">
+              <a:extLst>
+                <a:ext uri="{FF2B5EF4-FFF2-40B4-BE49-F238E27FC236}">
+                  <a16:creationId xmlns:a16="http://schemas.microsoft.com/office/drawing/2014/main" id="{8583EBB3-224D-493A-B37C-727D8A899621}"/>
+                </a:ext>
+              </a:extLst>
+            </p:cNvPr>
+            <p:cNvPicPr>
+              <a:picLocks noChangeAspect="1"/>
+            </p:cNvPicPr>
+            <p:nvPr/>
+          </p:nvPicPr>
+          <p:blipFill rotWithShape="1">
+            <a:blip r:embed="rId4">
+              <a:extLst>
+                <a:ext uri="{28A0092B-C50C-407E-A947-70E740481C1C}">
+                  <a14:useLocalDpi xmlns:a14="http://schemas.microsoft.com/office/drawing/2010/main" val="0"/>
+                </a:ext>
+              </a:extLst>
+            </a:blip>
+            <a:srcRect l="83240" t="26431" r="1529" b="27964"/>
+            <a:stretch/>
+          </p:blipFill>
+          <p:spPr>
+            <a:xfrm>
+              <a:off x="6462584" y="7823487"/>
+              <a:ext cx="1481371" cy="4435678"/>
+            </a:xfrm>
+            <a:prstGeom prst="rect">
+              <a:avLst/>
+            </a:prstGeom>
+          </p:spPr>
+        </p:pic>
+        <p:pic>
+          <p:nvPicPr>
+            <p:cNvPr id="18" name="Picture 17" descr="Shape&#10;&#10;Description automatically generated">
+              <a:extLst>
+                <a:ext uri="{FF2B5EF4-FFF2-40B4-BE49-F238E27FC236}">
+                  <a16:creationId xmlns:a16="http://schemas.microsoft.com/office/drawing/2014/main" id="{3307E3E3-DE91-4394-B45A-4B60406D6210}"/>
+                </a:ext>
+              </a:extLst>
+            </p:cNvPr>
+            <p:cNvPicPr>
+              <a:picLocks noChangeAspect="1"/>
+            </p:cNvPicPr>
+            <p:nvPr/>
+          </p:nvPicPr>
+          <p:blipFill rotWithShape="1">
+            <a:blip r:embed="rId3">
+              <a:extLst>
+                <a:ext uri="{28A0092B-C50C-407E-A947-70E740481C1C}">
+                  <a14:useLocalDpi xmlns:a14="http://schemas.microsoft.com/office/drawing/2010/main" val="0"/>
+                </a:ext>
+              </a:extLst>
+            </a:blip>
+            <a:srcRect l="88507" t="24893" r="1657" b="29564"/>
+            <a:stretch/>
+          </p:blipFill>
+          <p:spPr>
+            <a:xfrm>
+              <a:off x="6487296" y="2374406"/>
+              <a:ext cx="946984" cy="4384748"/>
+            </a:xfrm>
+            <a:prstGeom prst="rect">
+              <a:avLst/>
+            </a:prstGeom>
+          </p:spPr>
+        </p:pic>
+        <p:pic>
+          <p:nvPicPr>
+            <p:cNvPr id="19" name="Picture 18" descr="Shape&#10;&#10;Description automatically generated">
+              <a:extLst>
+                <a:ext uri="{FF2B5EF4-FFF2-40B4-BE49-F238E27FC236}">
+                  <a16:creationId xmlns:a16="http://schemas.microsoft.com/office/drawing/2014/main" id="{C91B5B5E-2E97-4936-A39B-44EDF4DC2E77}"/>
+                </a:ext>
+              </a:extLst>
+            </p:cNvPr>
+            <p:cNvPicPr>
+              <a:picLocks noChangeAspect="1"/>
+            </p:cNvPicPr>
+            <p:nvPr/>
+          </p:nvPicPr>
+          <p:blipFill rotWithShape="1">
+            <a:blip r:embed="rId2">
+              <a:extLst>
+                <a:ext uri="{28A0092B-C50C-407E-A947-70E740481C1C}">
+                  <a14:useLocalDpi xmlns:a14="http://schemas.microsoft.com/office/drawing/2010/main" val="0"/>
+                </a:ext>
+              </a:extLst>
+            </a:blip>
+            <a:srcRect l="87654" t="25270" r="1920" b="28197"/>
+            <a:stretch/>
+          </p:blipFill>
+          <p:spPr>
+            <a:xfrm>
+              <a:off x="6549082" y="-2743139"/>
+              <a:ext cx="946984" cy="4226200"/>
+            </a:xfrm>
+            <a:prstGeom prst="rect">
+              <a:avLst/>
+            </a:prstGeom>
+          </p:spPr>
+        </p:pic>
+        <p:sp>
+          <p:nvSpPr>
+            <p:cNvPr id="21" name="Rectangle 20">
+              <a:extLst>
+                <a:ext uri="{FF2B5EF4-FFF2-40B4-BE49-F238E27FC236}">
+                  <a16:creationId xmlns:a16="http://schemas.microsoft.com/office/drawing/2014/main" id="{04C1F44E-99EC-4479-8C30-B190A9EBF1BC}"/>
+                </a:ext>
+              </a:extLst>
+            </p:cNvPr>
+            <p:cNvSpPr/>
+            <p:nvPr/>
+          </p:nvSpPr>
+          <p:spPr>
+            <a:xfrm>
+              <a:off x="1144242" y="-3204251"/>
+              <a:ext cx="445317" cy="408709"/>
+            </a:xfrm>
+            <a:prstGeom prst="rect">
+              <a:avLst/>
+            </a:prstGeom>
+            <a:solidFill>
+              <a:schemeClr val="bg1"/>
+            </a:solidFill>
+            <a:ln>
+              <a:solidFill>
+                <a:schemeClr val="bg1"/>
+              </a:solidFill>
+            </a:ln>
+          </p:spPr>
+          <p:style>
+            <a:lnRef idx="2">
+              <a:schemeClr val="accent1">
+                <a:shade val="50000"/>
+              </a:schemeClr>
+            </a:lnRef>
+            <a:fillRef idx="1">
+              <a:schemeClr val="accent1"/>
+            </a:fillRef>
+            <a:effectRef idx="0">
+              <a:schemeClr val="accent1"/>
+            </a:effectRef>
+            <a:fontRef idx="minor">
+              <a:schemeClr val="lt1"/>
+            </a:fontRef>
+          </p:style>
+          <p:txBody>
+            <a:bodyPr rtlCol="0" anchor="ctr"/>
+            <a:lstStyle/>
+            <a:p>
+              <a:pPr algn="ctr"/>
+              <a:r>
+                <a:rPr lang="en-US" b="1" dirty="0">
+                  <a:solidFill>
+                    <a:schemeClr val="tx1"/>
+                  </a:solidFill>
+                </a:rPr>
+                <a:t>A)</a:t>
+              </a:r>
+            </a:p>
+          </p:txBody>
+        </p:sp>
+        <p:sp>
+          <p:nvSpPr>
+            <p:cNvPr id="22" name="Rectangle 21">
+              <a:extLst>
+                <a:ext uri="{FF2B5EF4-FFF2-40B4-BE49-F238E27FC236}">
+                  <a16:creationId xmlns:a16="http://schemas.microsoft.com/office/drawing/2014/main" id="{36B167EA-0D20-4608-AEA9-2458D957B308}"/>
+                </a:ext>
+              </a:extLst>
+            </p:cNvPr>
+            <p:cNvSpPr/>
+            <p:nvPr/>
+          </p:nvSpPr>
+          <p:spPr>
+            <a:xfrm>
+              <a:off x="1144242" y="1820849"/>
+              <a:ext cx="445317" cy="408709"/>
+            </a:xfrm>
+            <a:prstGeom prst="rect">
+              <a:avLst/>
+            </a:prstGeom>
+            <a:solidFill>
+              <a:schemeClr val="bg1"/>
+            </a:solidFill>
+            <a:ln>
+              <a:solidFill>
+                <a:schemeClr val="bg1"/>
+              </a:solidFill>
+            </a:ln>
+          </p:spPr>
+          <p:style>
+            <a:lnRef idx="2">
+              <a:schemeClr val="accent1">
+                <a:shade val="50000"/>
+              </a:schemeClr>
+            </a:lnRef>
+            <a:fillRef idx="1">
+              <a:schemeClr val="accent1"/>
+            </a:fillRef>
+            <a:effectRef idx="0">
+              <a:schemeClr val="accent1"/>
+            </a:effectRef>
+            <a:fontRef idx="minor">
+              <a:schemeClr val="lt1"/>
+            </a:fontRef>
+          </p:style>
+          <p:txBody>
+            <a:bodyPr rtlCol="0" anchor="ctr"/>
+            <a:lstStyle/>
+            <a:p>
+              <a:pPr algn="ctr"/>
+              <a:r>
+                <a:rPr lang="en-US" b="1" dirty="0">
+                  <a:solidFill>
+                    <a:schemeClr val="tx1"/>
+                  </a:solidFill>
+                </a:rPr>
+                <a:t>B)</a:t>
+              </a:r>
+            </a:p>
+          </p:txBody>
+        </p:sp>
+        <p:sp>
+          <p:nvSpPr>
+            <p:cNvPr id="23" name="Rectangle 22">
+              <a:extLst>
+                <a:ext uri="{FF2B5EF4-FFF2-40B4-BE49-F238E27FC236}">
+                  <a16:creationId xmlns:a16="http://schemas.microsoft.com/office/drawing/2014/main" id="{C1AA1F1E-C206-4FC0-847F-57FEBF404054}"/>
+                </a:ext>
+              </a:extLst>
+            </p:cNvPr>
+            <p:cNvSpPr/>
+            <p:nvPr/>
+          </p:nvSpPr>
+          <p:spPr>
+            <a:xfrm>
+              <a:off x="1144242" y="6932034"/>
+              <a:ext cx="445317" cy="408709"/>
+            </a:xfrm>
+            <a:prstGeom prst="rect">
+              <a:avLst/>
+            </a:prstGeom>
+            <a:solidFill>
+              <a:schemeClr val="bg1"/>
+            </a:solidFill>
+            <a:ln>
+              <a:solidFill>
+                <a:schemeClr val="bg1"/>
+              </a:solidFill>
+            </a:ln>
+          </p:spPr>
+          <p:style>
+            <a:lnRef idx="2">
+              <a:schemeClr val="accent1">
+                <a:shade val="50000"/>
+              </a:schemeClr>
+            </a:lnRef>
+            <a:fillRef idx="1">
+              <a:schemeClr val="accent1"/>
+            </a:fillRef>
+            <a:effectRef idx="0">
+              <a:schemeClr val="accent1"/>
+            </a:effectRef>
+            <a:fontRef idx="minor">
+              <a:schemeClr val="lt1"/>
+            </a:fontRef>
+          </p:style>
+          <p:txBody>
+            <a:bodyPr rtlCol="0" anchor="ctr"/>
+            <a:lstStyle/>
+            <a:p>
+              <a:pPr algn="ctr"/>
+              <a:r>
+                <a:rPr lang="en-US" b="1" dirty="0">
+                  <a:solidFill>
+                    <a:schemeClr val="tx1"/>
+                  </a:solidFill>
+                </a:rPr>
+                <a:t>C)</a:t>
+              </a:r>
+            </a:p>
+          </p:txBody>
+        </p:sp>
+      </p:grpSp>
+    </p:spTree>
+    <p:extLst>
+      <p:ext uri="{BB962C8B-B14F-4D97-AF65-F5344CB8AC3E}">
+        <p14:creationId xmlns:p14="http://schemas.microsoft.com/office/powerpoint/2010/main" val="1241487079"/>
+      </p:ext>
+    </p:extLst>
+  </p:cSld>
+  <p:clrMapOvr>
+    <a:masterClrMapping/>
+  </p:clrMapOvr>
+</p:sld>
+</file>
+
+<file path=ppt/slides/slide14.xml><?xml version="1.0" encoding="utf-8"?>
+<p:sld xmlns:a="http://schemas.openxmlformats.org/drawingml/2006/main" xmlns:r="http://schemas.openxmlformats.org/officeDocument/2006/relationships" xmlns:p="http://schemas.openxmlformats.org/presentationml/2006/main">
+  <p:cSld>
+    <p:spTree>
+      <p:nvGrpSpPr>
+        <p:cNvPr id="1" name=""/>
+        <p:cNvGrpSpPr/>
+        <p:nvPr/>
+      </p:nvGrpSpPr>
+      <p:grpSpPr>
+        <a:xfrm>
+          <a:off x="0" y="0"/>
+          <a:ext cx="0" cy="0"/>
+          <a:chOff x="0" y="0"/>
+          <a:chExt cx="0" cy="0"/>
+        </a:xfrm>
+      </p:grpSpPr>
+      <p:grpSp>
+        <p:nvGrpSpPr>
+          <p:cNvPr id="24" name="Group 23">
+            <a:extLst>
+              <a:ext uri="{FF2B5EF4-FFF2-40B4-BE49-F238E27FC236}">
+                <a16:creationId xmlns:a16="http://schemas.microsoft.com/office/drawing/2014/main" id="{FDA38EA0-E292-4FD6-922B-9E7AD7B5ED44}"/>
+              </a:ext>
+            </a:extLst>
+          </p:cNvPr>
+          <p:cNvGrpSpPr/>
+          <p:nvPr/>
+        </p:nvGrpSpPr>
+        <p:grpSpPr>
+          <a:xfrm>
+            <a:off x="1113844" y="-3311613"/>
+            <a:ext cx="6830111" cy="17114124"/>
+            <a:chOff x="1113844" y="-3311613"/>
+            <a:chExt cx="6830111" cy="17114124"/>
+          </a:xfrm>
+        </p:grpSpPr>
+        <p:pic>
+          <p:nvPicPr>
+            <p:cNvPr id="7" name="Picture 6" descr="Shape&#10;&#10;Description automatically generated">
+              <a:extLst>
+                <a:ext uri="{FF2B5EF4-FFF2-40B4-BE49-F238E27FC236}">
+                  <a16:creationId xmlns:a16="http://schemas.microsoft.com/office/drawing/2014/main" id="{CF73D72A-8976-4B04-BA4A-E23C2D4E731D}"/>
+                </a:ext>
+              </a:extLst>
+            </p:cNvPr>
+            <p:cNvPicPr>
+              <a:picLocks noChangeAspect="1"/>
+            </p:cNvPicPr>
+            <p:nvPr/>
+          </p:nvPicPr>
+          <p:blipFill rotWithShape="1">
+            <a:blip r:embed="rId2">
+              <a:extLst>
+                <a:ext uri="{28A0092B-C50C-407E-A947-70E740481C1C}">
+                  <a14:useLocalDpi xmlns:a14="http://schemas.microsoft.com/office/drawing/2010/main" val="0"/>
+                </a:ext>
+              </a:extLst>
+            </a:blip>
+            <a:srcRect r="14451"/>
+            <a:stretch/>
+          </p:blipFill>
+          <p:spPr>
+            <a:xfrm>
+              <a:off x="1149106" y="-3311613"/>
+              <a:ext cx="5202267" cy="6081029"/>
+            </a:xfrm>
+            <a:prstGeom prst="rect">
+              <a:avLst/>
+            </a:prstGeom>
+          </p:spPr>
+        </p:pic>
+        <p:pic>
+          <p:nvPicPr>
+            <p:cNvPr id="10" name="Picture 9" descr="Shape&#10;&#10;Description automatically generated">
+              <a:extLst>
+                <a:ext uri="{FF2B5EF4-FFF2-40B4-BE49-F238E27FC236}">
+                  <a16:creationId xmlns:a16="http://schemas.microsoft.com/office/drawing/2014/main" id="{D4B8190B-DF2E-4153-889F-EDDB1A5A808F}"/>
+                </a:ext>
+              </a:extLst>
+            </p:cNvPr>
+            <p:cNvPicPr>
+              <a:picLocks noChangeAspect="1"/>
+            </p:cNvPicPr>
+            <p:nvPr/>
+          </p:nvPicPr>
+          <p:blipFill rotWithShape="1">
+            <a:blip r:embed="rId3">
+              <a:extLst>
+                <a:ext uri="{28A0092B-C50C-407E-A947-70E740481C1C}">
+                  <a14:useLocalDpi xmlns:a14="http://schemas.microsoft.com/office/drawing/2010/main" val="0"/>
+                </a:ext>
+              </a:extLst>
+            </a:blip>
+            <a:srcRect t="9292" r="13266" b="16139"/>
+            <a:stretch/>
+          </p:blipFill>
+          <p:spPr>
+            <a:xfrm>
+              <a:off x="1144242" y="2285600"/>
+              <a:ext cx="5318342" cy="4572400"/>
+            </a:xfrm>
+            <a:prstGeom prst="rect">
+              <a:avLst/>
+            </a:prstGeom>
+          </p:spPr>
+        </p:pic>
+        <p:pic>
+          <p:nvPicPr>
+            <p:cNvPr id="12" name="Picture 11" descr="Chart, bar chart&#10;&#10;Description automatically generated">
+              <a:extLst>
+                <a:ext uri="{FF2B5EF4-FFF2-40B4-BE49-F238E27FC236}">
+                  <a16:creationId xmlns:a16="http://schemas.microsoft.com/office/drawing/2014/main" id="{AFBD0492-BE67-4CE6-B7B4-CD45722F61B7}"/>
+                </a:ext>
+              </a:extLst>
+            </p:cNvPr>
+            <p:cNvPicPr>
+              <a:picLocks noChangeAspect="1"/>
+            </p:cNvPicPr>
+            <p:nvPr/>
+          </p:nvPicPr>
+          <p:blipFill rotWithShape="1">
+            <a:blip r:embed="rId4">
+              <a:extLst>
+                <a:ext uri="{28A0092B-C50C-407E-A947-70E740481C1C}">
+                  <a14:useLocalDpi xmlns:a14="http://schemas.microsoft.com/office/drawing/2010/main" val="0"/>
+                </a:ext>
+              </a:extLst>
+            </a:blip>
+            <a:srcRect t="1179" r="20124"/>
+            <a:stretch/>
+          </p:blipFill>
+          <p:spPr>
+            <a:xfrm>
+              <a:off x="1113844" y="7322818"/>
+              <a:ext cx="5237529" cy="6479693"/>
+            </a:xfrm>
+            <a:prstGeom prst="rect">
+              <a:avLst/>
+            </a:prstGeom>
+          </p:spPr>
+        </p:pic>
+        <p:sp>
+          <p:nvSpPr>
+            <p:cNvPr id="14" name="Rectangle 13">
+              <a:extLst>
+                <a:ext uri="{FF2B5EF4-FFF2-40B4-BE49-F238E27FC236}">
+                  <a16:creationId xmlns:a16="http://schemas.microsoft.com/office/drawing/2014/main" id="{910149E6-9285-4B73-BC64-B0B9EBFDEE6D}"/>
+                </a:ext>
+              </a:extLst>
+            </p:cNvPr>
+            <p:cNvSpPr/>
+            <p:nvPr/>
+          </p:nvSpPr>
+          <p:spPr>
+            <a:xfrm>
+              <a:off x="1911177" y="6870353"/>
+              <a:ext cx="4307181" cy="508769"/>
+            </a:xfrm>
+            <a:prstGeom prst="rect">
+              <a:avLst/>
+            </a:prstGeom>
+            <a:solidFill>
+              <a:srgbClr val="81A1B1"/>
+            </a:solidFill>
+            <a:ln>
+              <a:solidFill>
+                <a:schemeClr val="bg1"/>
+              </a:solidFill>
+            </a:ln>
+          </p:spPr>
+          <p:style>
+            <a:lnRef idx="2">
+              <a:schemeClr val="accent1">
+                <a:shade val="50000"/>
+              </a:schemeClr>
+            </a:lnRef>
+            <a:fillRef idx="1">
+              <a:schemeClr val="accent1"/>
+            </a:fillRef>
+            <a:effectRef idx="0">
+              <a:schemeClr val="accent1"/>
+            </a:effectRef>
+            <a:fontRef idx="minor">
+              <a:schemeClr val="lt1"/>
+            </a:fontRef>
+          </p:style>
+          <p:txBody>
+            <a:bodyPr rtlCol="0" anchor="ctr"/>
+            <a:lstStyle/>
+            <a:p>
+              <a:pPr algn="ctr"/>
+              <a:r>
+                <a:rPr lang="en-US" b="1" dirty="0">
+                  <a:solidFill>
+                    <a:schemeClr val="tx1"/>
+                  </a:solidFill>
+                </a:rPr>
+                <a:t>Lambda Slope over initial 20 years</a:t>
+              </a:r>
+            </a:p>
+          </p:txBody>
+        </p:sp>
+        <p:sp>
+          <p:nvSpPr>
+            <p:cNvPr id="15" name="Rectangle 14">
+              <a:extLst>
+                <a:ext uri="{FF2B5EF4-FFF2-40B4-BE49-F238E27FC236}">
+                  <a16:creationId xmlns:a16="http://schemas.microsoft.com/office/drawing/2014/main" id="{8AA17C0F-344A-4CD0-8DB7-A30DB199043B}"/>
+                </a:ext>
+              </a:extLst>
+            </p:cNvPr>
+            <p:cNvSpPr/>
+            <p:nvPr/>
+          </p:nvSpPr>
+          <p:spPr>
+            <a:xfrm>
+              <a:off x="1911177" y="1770820"/>
+              <a:ext cx="4307181" cy="508769"/>
+            </a:xfrm>
+            <a:prstGeom prst="rect">
+              <a:avLst/>
+            </a:prstGeom>
+            <a:solidFill>
+              <a:srgbClr val="81A1B1"/>
+            </a:solidFill>
+            <a:ln>
+              <a:solidFill>
+                <a:schemeClr val="bg1"/>
+              </a:solidFill>
+            </a:ln>
+          </p:spPr>
+          <p:style>
+            <a:lnRef idx="2">
+              <a:schemeClr val="accent1">
+                <a:shade val="50000"/>
+              </a:schemeClr>
+            </a:lnRef>
+            <a:fillRef idx="1">
+              <a:schemeClr val="accent1"/>
+            </a:fillRef>
+            <a:effectRef idx="0">
+              <a:schemeClr val="accent1"/>
+            </a:effectRef>
+            <a:fontRef idx="minor">
+              <a:schemeClr val="lt1"/>
+            </a:fontRef>
+          </p:style>
+          <p:txBody>
+            <a:bodyPr rtlCol="0" anchor="ctr"/>
+            <a:lstStyle/>
+            <a:p>
+              <a:pPr algn="ctr"/>
+              <a:r>
+                <a:rPr lang="en-US" b="1" dirty="0">
+                  <a:solidFill>
+                    <a:schemeClr val="tx1"/>
+                  </a:solidFill>
+                </a:rPr>
+                <a:t>Harvest Slope over initial 20 years</a:t>
+              </a:r>
+            </a:p>
+          </p:txBody>
+        </p:sp>
+        <p:sp>
+          <p:nvSpPr>
+            <p:cNvPr id="16" name="Rectangle 15">
+              <a:extLst>
+                <a:ext uri="{FF2B5EF4-FFF2-40B4-BE49-F238E27FC236}">
+                  <a16:creationId xmlns:a16="http://schemas.microsoft.com/office/drawing/2014/main" id="{129E80C1-1F2B-49FD-B2ED-448242E8A737}"/>
+                </a:ext>
+              </a:extLst>
+            </p:cNvPr>
+            <p:cNvSpPr/>
+            <p:nvPr/>
+          </p:nvSpPr>
+          <p:spPr>
+            <a:xfrm>
+              <a:off x="1911177" y="-3254280"/>
+              <a:ext cx="4307181" cy="508769"/>
+            </a:xfrm>
+            <a:prstGeom prst="rect">
+              <a:avLst/>
+            </a:prstGeom>
+            <a:solidFill>
+              <a:srgbClr val="81A1B1"/>
+            </a:solidFill>
+            <a:ln>
+              <a:solidFill>
+                <a:schemeClr val="bg1"/>
+              </a:solidFill>
+            </a:ln>
+          </p:spPr>
+          <p:style>
+            <a:lnRef idx="2">
+              <a:schemeClr val="accent1">
+                <a:shade val="50000"/>
+              </a:schemeClr>
+            </a:lnRef>
+            <a:fillRef idx="1">
+              <a:schemeClr val="accent1"/>
+            </a:fillRef>
+            <a:effectRef idx="0">
+              <a:schemeClr val="accent1"/>
+            </a:effectRef>
+            <a:fontRef idx="minor">
+              <a:schemeClr val="lt1"/>
+            </a:fontRef>
+          </p:style>
+          <p:txBody>
+            <a:bodyPr rtlCol="0" anchor="ctr"/>
+            <a:lstStyle/>
+            <a:p>
+              <a:pPr algn="ctr"/>
+              <a:r>
+                <a:rPr lang="en-US" b="1" dirty="0">
+                  <a:solidFill>
+                    <a:schemeClr val="tx1"/>
+                  </a:solidFill>
+                </a:rPr>
+                <a:t>Fish Population Slope over initial 20 years</a:t>
+              </a:r>
+            </a:p>
+          </p:txBody>
+        </p:sp>
+        <p:pic>
+          <p:nvPicPr>
+            <p:cNvPr id="17" name="Picture 16" descr="Chart, bar chart&#10;&#10;Description automatically generated">
+              <a:extLst>
+                <a:ext uri="{FF2B5EF4-FFF2-40B4-BE49-F238E27FC236}">
+                  <a16:creationId xmlns:a16="http://schemas.microsoft.com/office/drawing/2014/main" id="{8583EBB3-224D-493A-B37C-727D8A899621}"/>
+                </a:ext>
+              </a:extLst>
+            </p:cNvPr>
+            <p:cNvPicPr>
+              <a:picLocks noChangeAspect="1"/>
+            </p:cNvPicPr>
+            <p:nvPr/>
+          </p:nvPicPr>
+          <p:blipFill rotWithShape="1">
+            <a:blip r:embed="rId4">
+              <a:extLst>
+                <a:ext uri="{28A0092B-C50C-407E-A947-70E740481C1C}">
+                  <a14:useLocalDpi xmlns:a14="http://schemas.microsoft.com/office/drawing/2010/main" val="0"/>
+                </a:ext>
+              </a:extLst>
+            </a:blip>
+            <a:srcRect l="83240" t="26431" r="1529" b="27964"/>
+            <a:stretch/>
+          </p:blipFill>
+          <p:spPr>
+            <a:xfrm>
+              <a:off x="6462584" y="7823487"/>
+              <a:ext cx="1481371" cy="4435678"/>
+            </a:xfrm>
+            <a:prstGeom prst="rect">
+              <a:avLst/>
+            </a:prstGeom>
+          </p:spPr>
+        </p:pic>
+        <p:pic>
+          <p:nvPicPr>
+            <p:cNvPr id="18" name="Picture 17" descr="Shape&#10;&#10;Description automatically generated">
+              <a:extLst>
+                <a:ext uri="{FF2B5EF4-FFF2-40B4-BE49-F238E27FC236}">
+                  <a16:creationId xmlns:a16="http://schemas.microsoft.com/office/drawing/2014/main" id="{3307E3E3-DE91-4394-B45A-4B60406D6210}"/>
+                </a:ext>
+              </a:extLst>
+            </p:cNvPr>
+            <p:cNvPicPr>
+              <a:picLocks noChangeAspect="1"/>
+            </p:cNvPicPr>
+            <p:nvPr/>
+          </p:nvPicPr>
+          <p:blipFill rotWithShape="1">
+            <a:blip r:embed="rId3">
+              <a:extLst>
+                <a:ext uri="{28A0092B-C50C-407E-A947-70E740481C1C}">
+                  <a14:useLocalDpi xmlns:a14="http://schemas.microsoft.com/office/drawing/2010/main" val="0"/>
+                </a:ext>
+              </a:extLst>
+            </a:blip>
+            <a:srcRect l="88507" t="24893" r="1657" b="29564"/>
+            <a:stretch/>
+          </p:blipFill>
+          <p:spPr>
+            <a:xfrm>
+              <a:off x="6487296" y="2374406"/>
+              <a:ext cx="946984" cy="4384748"/>
+            </a:xfrm>
+            <a:prstGeom prst="rect">
+              <a:avLst/>
+            </a:prstGeom>
+          </p:spPr>
+        </p:pic>
+        <p:pic>
+          <p:nvPicPr>
+            <p:cNvPr id="19" name="Picture 18" descr="Shape&#10;&#10;Description automatically generated">
+              <a:extLst>
+                <a:ext uri="{FF2B5EF4-FFF2-40B4-BE49-F238E27FC236}">
+                  <a16:creationId xmlns:a16="http://schemas.microsoft.com/office/drawing/2014/main" id="{C91B5B5E-2E97-4936-A39B-44EDF4DC2E77}"/>
+                </a:ext>
+              </a:extLst>
+            </p:cNvPr>
+            <p:cNvPicPr>
+              <a:picLocks noChangeAspect="1"/>
+            </p:cNvPicPr>
+            <p:nvPr/>
+          </p:nvPicPr>
+          <p:blipFill rotWithShape="1">
+            <a:blip r:embed="rId2">
+              <a:extLst>
+                <a:ext uri="{28A0092B-C50C-407E-A947-70E740481C1C}">
+                  <a14:useLocalDpi xmlns:a14="http://schemas.microsoft.com/office/drawing/2010/main" val="0"/>
+                </a:ext>
+              </a:extLst>
+            </a:blip>
+            <a:srcRect l="87654" t="25270" r="1920" b="28197"/>
+            <a:stretch/>
+          </p:blipFill>
+          <p:spPr>
+            <a:xfrm>
+              <a:off x="6549082" y="-2743139"/>
+              <a:ext cx="946984" cy="4226200"/>
+            </a:xfrm>
+            <a:prstGeom prst="rect">
+              <a:avLst/>
+            </a:prstGeom>
+          </p:spPr>
+        </p:pic>
+        <p:sp>
+          <p:nvSpPr>
+            <p:cNvPr id="21" name="Rectangle 20">
+              <a:extLst>
+                <a:ext uri="{FF2B5EF4-FFF2-40B4-BE49-F238E27FC236}">
+                  <a16:creationId xmlns:a16="http://schemas.microsoft.com/office/drawing/2014/main" id="{04C1F44E-99EC-4479-8C30-B190A9EBF1BC}"/>
+                </a:ext>
+              </a:extLst>
+            </p:cNvPr>
+            <p:cNvSpPr/>
+            <p:nvPr/>
+          </p:nvSpPr>
+          <p:spPr>
+            <a:xfrm>
+              <a:off x="1144242" y="-3204251"/>
+              <a:ext cx="445317" cy="408709"/>
+            </a:xfrm>
+            <a:prstGeom prst="rect">
+              <a:avLst/>
+            </a:prstGeom>
+            <a:solidFill>
+              <a:schemeClr val="bg1"/>
+            </a:solidFill>
+            <a:ln>
+              <a:solidFill>
+                <a:schemeClr val="bg1"/>
+              </a:solidFill>
+            </a:ln>
+          </p:spPr>
+          <p:style>
+            <a:lnRef idx="2">
+              <a:schemeClr val="accent1">
+                <a:shade val="50000"/>
+              </a:schemeClr>
+            </a:lnRef>
+            <a:fillRef idx="1">
+              <a:schemeClr val="accent1"/>
+            </a:fillRef>
+            <a:effectRef idx="0">
+              <a:schemeClr val="accent1"/>
+            </a:effectRef>
+            <a:fontRef idx="minor">
+              <a:schemeClr val="lt1"/>
+            </a:fontRef>
+          </p:style>
+          <p:txBody>
+            <a:bodyPr rtlCol="0" anchor="ctr"/>
+            <a:lstStyle/>
+            <a:p>
+              <a:pPr algn="ctr"/>
+              <a:r>
+                <a:rPr lang="en-US" b="1" dirty="0">
+                  <a:solidFill>
+                    <a:schemeClr val="tx1"/>
+                  </a:solidFill>
+                </a:rPr>
+                <a:t>A)</a:t>
+              </a:r>
+            </a:p>
+          </p:txBody>
+        </p:sp>
+        <p:sp>
+          <p:nvSpPr>
+            <p:cNvPr id="22" name="Rectangle 21">
+              <a:extLst>
+                <a:ext uri="{FF2B5EF4-FFF2-40B4-BE49-F238E27FC236}">
+                  <a16:creationId xmlns:a16="http://schemas.microsoft.com/office/drawing/2014/main" id="{36B167EA-0D20-4608-AEA9-2458D957B308}"/>
+                </a:ext>
+              </a:extLst>
+            </p:cNvPr>
+            <p:cNvSpPr/>
+            <p:nvPr/>
+          </p:nvSpPr>
+          <p:spPr>
+            <a:xfrm>
+              <a:off x="1144242" y="1820849"/>
+              <a:ext cx="445317" cy="408709"/>
+            </a:xfrm>
+            <a:prstGeom prst="rect">
+              <a:avLst/>
+            </a:prstGeom>
+            <a:solidFill>
+              <a:schemeClr val="bg1"/>
+            </a:solidFill>
+            <a:ln>
+              <a:solidFill>
+                <a:schemeClr val="bg1"/>
+              </a:solidFill>
+            </a:ln>
+          </p:spPr>
+          <p:style>
+            <a:lnRef idx="2">
+              <a:schemeClr val="accent1">
+                <a:shade val="50000"/>
+              </a:schemeClr>
+            </a:lnRef>
+            <a:fillRef idx="1">
+              <a:schemeClr val="accent1"/>
+            </a:fillRef>
+            <a:effectRef idx="0">
+              <a:schemeClr val="accent1"/>
+            </a:effectRef>
+            <a:fontRef idx="minor">
+              <a:schemeClr val="lt1"/>
+            </a:fontRef>
+          </p:style>
+          <p:txBody>
+            <a:bodyPr rtlCol="0" anchor="ctr"/>
+            <a:lstStyle/>
+            <a:p>
+              <a:pPr algn="ctr"/>
+              <a:r>
+                <a:rPr lang="en-US" b="1" dirty="0">
+                  <a:solidFill>
+                    <a:schemeClr val="tx1"/>
+                  </a:solidFill>
+                </a:rPr>
+                <a:t>B)</a:t>
+              </a:r>
+            </a:p>
+          </p:txBody>
+        </p:sp>
+        <p:sp>
+          <p:nvSpPr>
+            <p:cNvPr id="23" name="Rectangle 22">
+              <a:extLst>
+                <a:ext uri="{FF2B5EF4-FFF2-40B4-BE49-F238E27FC236}">
+                  <a16:creationId xmlns:a16="http://schemas.microsoft.com/office/drawing/2014/main" id="{C1AA1F1E-C206-4FC0-847F-57FEBF404054}"/>
+                </a:ext>
+              </a:extLst>
+            </p:cNvPr>
+            <p:cNvSpPr/>
+            <p:nvPr/>
+          </p:nvSpPr>
+          <p:spPr>
+            <a:xfrm>
+              <a:off x="1144242" y="6932034"/>
+              <a:ext cx="445317" cy="408709"/>
+            </a:xfrm>
+            <a:prstGeom prst="rect">
+              <a:avLst/>
+            </a:prstGeom>
+            <a:solidFill>
+              <a:schemeClr val="bg1"/>
+            </a:solidFill>
+            <a:ln>
+              <a:solidFill>
+                <a:schemeClr val="bg1"/>
+              </a:solidFill>
+            </a:ln>
+          </p:spPr>
+          <p:style>
+            <a:lnRef idx="2">
+              <a:schemeClr val="accent1">
+                <a:shade val="50000"/>
+              </a:schemeClr>
+            </a:lnRef>
+            <a:fillRef idx="1">
+              <a:schemeClr val="accent1"/>
+            </a:fillRef>
+            <a:effectRef idx="0">
+              <a:schemeClr val="accent1"/>
+            </a:effectRef>
+            <a:fontRef idx="minor">
+              <a:schemeClr val="lt1"/>
+            </a:fontRef>
+          </p:style>
+          <p:txBody>
+            <a:bodyPr rtlCol="0" anchor="ctr"/>
+            <a:lstStyle/>
+            <a:p>
+              <a:pPr algn="ctr"/>
+              <a:r>
+                <a:rPr lang="en-US" b="1" dirty="0">
+                  <a:solidFill>
+                    <a:schemeClr val="tx1"/>
+                  </a:solidFill>
+                </a:rPr>
+                <a:t>C)</a:t>
+              </a:r>
+            </a:p>
+          </p:txBody>
+        </p:sp>
+      </p:grpSp>
+    </p:spTree>
+    <p:extLst>
+      <p:ext uri="{BB962C8B-B14F-4D97-AF65-F5344CB8AC3E}">
+        <p14:creationId xmlns:p14="http://schemas.microsoft.com/office/powerpoint/2010/main" val="2531530650"/>
+      </p:ext>
+    </p:extLst>
+  </p:cSld>
+  <p:clrMapOvr>
+    <a:masterClrMapping/>
+  </p:clrMapOvr>
+</p:sld>
+</file>
+
+<file path=ppt/slides/slide15.xml><?xml version="1.0" encoding="utf-8"?>
+<p:sld xmlns:a="http://schemas.openxmlformats.org/drawingml/2006/main" xmlns:r="http://schemas.openxmlformats.org/officeDocument/2006/relationships" xmlns:p="http://schemas.openxmlformats.org/presentationml/2006/main">
+  <p:cSld>
+    <p:spTree>
+      <p:nvGrpSpPr>
+        <p:cNvPr id="1" name=""/>
+        <p:cNvGrpSpPr/>
+        <p:nvPr/>
+      </p:nvGrpSpPr>
+      <p:grpSpPr>
+        <a:xfrm>
+          <a:off x="0" y="0"/>
+          <a:ext cx="0" cy="0"/>
+          <a:chOff x="0" y="0"/>
+          <a:chExt cx="0" cy="0"/>
+        </a:xfrm>
+      </p:grpSpPr>
+      <p:grpSp>
+        <p:nvGrpSpPr>
+          <p:cNvPr id="24" name="Group 23">
+            <a:extLst>
+              <a:ext uri="{FF2B5EF4-FFF2-40B4-BE49-F238E27FC236}">
+                <a16:creationId xmlns:a16="http://schemas.microsoft.com/office/drawing/2014/main" id="{FDA38EA0-E292-4FD6-922B-9E7AD7B5ED44}"/>
+              </a:ext>
+            </a:extLst>
+          </p:cNvPr>
+          <p:cNvGrpSpPr/>
+          <p:nvPr/>
+        </p:nvGrpSpPr>
+        <p:grpSpPr>
+          <a:xfrm>
+            <a:off x="1113844" y="-3311613"/>
+            <a:ext cx="6830111" cy="17114124"/>
+            <a:chOff x="1113844" y="-3311613"/>
+            <a:chExt cx="6830111" cy="17114124"/>
+          </a:xfrm>
+        </p:grpSpPr>
+        <p:pic>
+          <p:nvPicPr>
+            <p:cNvPr id="7" name="Picture 6" descr="Shape&#10;&#10;Description automatically generated">
+              <a:extLst>
+                <a:ext uri="{FF2B5EF4-FFF2-40B4-BE49-F238E27FC236}">
+                  <a16:creationId xmlns:a16="http://schemas.microsoft.com/office/drawing/2014/main" id="{CF73D72A-8976-4B04-BA4A-E23C2D4E731D}"/>
+                </a:ext>
+              </a:extLst>
+            </p:cNvPr>
+            <p:cNvPicPr>
+              <a:picLocks noChangeAspect="1"/>
+            </p:cNvPicPr>
+            <p:nvPr/>
+          </p:nvPicPr>
+          <p:blipFill rotWithShape="1">
+            <a:blip r:embed="rId2">
+              <a:extLst>
+                <a:ext uri="{28A0092B-C50C-407E-A947-70E740481C1C}">
+                  <a14:useLocalDpi xmlns:a14="http://schemas.microsoft.com/office/drawing/2010/main" val="0"/>
+                </a:ext>
+              </a:extLst>
+            </a:blip>
+            <a:srcRect r="14451"/>
+            <a:stretch/>
+          </p:blipFill>
+          <p:spPr>
+            <a:xfrm>
+              <a:off x="1149106" y="-3311613"/>
+              <a:ext cx="5202267" cy="6081029"/>
+            </a:xfrm>
+            <a:prstGeom prst="rect">
+              <a:avLst/>
+            </a:prstGeom>
+          </p:spPr>
+        </p:pic>
+        <p:pic>
+          <p:nvPicPr>
+            <p:cNvPr id="10" name="Picture 9" descr="Shape&#10;&#10;Description automatically generated">
+              <a:extLst>
+                <a:ext uri="{FF2B5EF4-FFF2-40B4-BE49-F238E27FC236}">
+                  <a16:creationId xmlns:a16="http://schemas.microsoft.com/office/drawing/2014/main" id="{D4B8190B-DF2E-4153-889F-EDDB1A5A808F}"/>
+                </a:ext>
+              </a:extLst>
+            </p:cNvPr>
+            <p:cNvPicPr>
+              <a:picLocks noChangeAspect="1"/>
+            </p:cNvPicPr>
+            <p:nvPr/>
+          </p:nvPicPr>
+          <p:blipFill rotWithShape="1">
+            <a:blip r:embed="rId3">
+              <a:extLst>
+                <a:ext uri="{28A0092B-C50C-407E-A947-70E740481C1C}">
+                  <a14:useLocalDpi xmlns:a14="http://schemas.microsoft.com/office/drawing/2010/main" val="0"/>
+                </a:ext>
+              </a:extLst>
+            </a:blip>
+            <a:srcRect t="9292" r="13266" b="16139"/>
+            <a:stretch/>
+          </p:blipFill>
+          <p:spPr>
+            <a:xfrm>
+              <a:off x="1144242" y="2285600"/>
+              <a:ext cx="5318342" cy="4572400"/>
+            </a:xfrm>
+            <a:prstGeom prst="rect">
+              <a:avLst/>
+            </a:prstGeom>
+          </p:spPr>
+        </p:pic>
+        <p:pic>
+          <p:nvPicPr>
+            <p:cNvPr id="12" name="Picture 11" descr="Chart, bar chart&#10;&#10;Description automatically generated">
+              <a:extLst>
+                <a:ext uri="{FF2B5EF4-FFF2-40B4-BE49-F238E27FC236}">
+                  <a16:creationId xmlns:a16="http://schemas.microsoft.com/office/drawing/2014/main" id="{AFBD0492-BE67-4CE6-B7B4-CD45722F61B7}"/>
+                </a:ext>
+              </a:extLst>
+            </p:cNvPr>
+            <p:cNvPicPr>
+              <a:picLocks noChangeAspect="1"/>
+            </p:cNvPicPr>
+            <p:nvPr/>
+          </p:nvPicPr>
+          <p:blipFill rotWithShape="1">
+            <a:blip r:embed="rId4">
+              <a:extLst>
+                <a:ext uri="{28A0092B-C50C-407E-A947-70E740481C1C}">
+                  <a14:useLocalDpi xmlns:a14="http://schemas.microsoft.com/office/drawing/2010/main" val="0"/>
+                </a:ext>
+              </a:extLst>
+            </a:blip>
+            <a:srcRect t="1179" r="20124"/>
+            <a:stretch/>
+          </p:blipFill>
+          <p:spPr>
+            <a:xfrm>
+              <a:off x="1113844" y="7322818"/>
+              <a:ext cx="5237529" cy="6479693"/>
+            </a:xfrm>
+            <a:prstGeom prst="rect">
+              <a:avLst/>
+            </a:prstGeom>
+          </p:spPr>
+        </p:pic>
+        <p:sp>
+          <p:nvSpPr>
+            <p:cNvPr id="14" name="Rectangle 13">
+              <a:extLst>
+                <a:ext uri="{FF2B5EF4-FFF2-40B4-BE49-F238E27FC236}">
+                  <a16:creationId xmlns:a16="http://schemas.microsoft.com/office/drawing/2014/main" id="{910149E6-9285-4B73-BC64-B0B9EBFDEE6D}"/>
+                </a:ext>
+              </a:extLst>
+            </p:cNvPr>
+            <p:cNvSpPr/>
+            <p:nvPr/>
+          </p:nvSpPr>
+          <p:spPr>
+            <a:xfrm>
+              <a:off x="1911177" y="6870353"/>
+              <a:ext cx="4307181" cy="508769"/>
+            </a:xfrm>
+            <a:prstGeom prst="rect">
+              <a:avLst/>
+            </a:prstGeom>
+            <a:solidFill>
+              <a:srgbClr val="81A1B1"/>
+            </a:solidFill>
+            <a:ln>
+              <a:solidFill>
+                <a:schemeClr val="bg1"/>
+              </a:solidFill>
+            </a:ln>
+          </p:spPr>
+          <p:style>
+            <a:lnRef idx="2">
+              <a:schemeClr val="accent1">
+                <a:shade val="50000"/>
+              </a:schemeClr>
+            </a:lnRef>
+            <a:fillRef idx="1">
+              <a:schemeClr val="accent1"/>
+            </a:fillRef>
+            <a:effectRef idx="0">
+              <a:schemeClr val="accent1"/>
+            </a:effectRef>
+            <a:fontRef idx="minor">
+              <a:schemeClr val="lt1"/>
+            </a:fontRef>
+          </p:style>
+          <p:txBody>
+            <a:bodyPr rtlCol="0" anchor="ctr"/>
+            <a:lstStyle/>
+            <a:p>
+              <a:pPr algn="ctr"/>
+              <a:r>
+                <a:rPr lang="en-US" b="1" dirty="0">
+                  <a:solidFill>
+                    <a:schemeClr val="tx1"/>
+                  </a:solidFill>
+                </a:rPr>
+                <a:t>Lambda Slope over initial 20 years</a:t>
+              </a:r>
+            </a:p>
+          </p:txBody>
+        </p:sp>
+        <p:sp>
+          <p:nvSpPr>
+            <p:cNvPr id="15" name="Rectangle 14">
+              <a:extLst>
+                <a:ext uri="{FF2B5EF4-FFF2-40B4-BE49-F238E27FC236}">
+                  <a16:creationId xmlns:a16="http://schemas.microsoft.com/office/drawing/2014/main" id="{8AA17C0F-344A-4CD0-8DB7-A30DB199043B}"/>
+                </a:ext>
+              </a:extLst>
+            </p:cNvPr>
+            <p:cNvSpPr/>
+            <p:nvPr/>
+          </p:nvSpPr>
+          <p:spPr>
+            <a:xfrm>
+              <a:off x="1911177" y="1770820"/>
+              <a:ext cx="4307181" cy="508769"/>
+            </a:xfrm>
+            <a:prstGeom prst="rect">
+              <a:avLst/>
+            </a:prstGeom>
+            <a:solidFill>
+              <a:srgbClr val="81A1B1"/>
+            </a:solidFill>
+            <a:ln>
+              <a:solidFill>
+                <a:schemeClr val="bg1"/>
+              </a:solidFill>
+            </a:ln>
+          </p:spPr>
+          <p:style>
+            <a:lnRef idx="2">
+              <a:schemeClr val="accent1">
+                <a:shade val="50000"/>
+              </a:schemeClr>
+            </a:lnRef>
+            <a:fillRef idx="1">
+              <a:schemeClr val="accent1"/>
+            </a:fillRef>
+            <a:effectRef idx="0">
+              <a:schemeClr val="accent1"/>
+            </a:effectRef>
+            <a:fontRef idx="minor">
+              <a:schemeClr val="lt1"/>
+            </a:fontRef>
+          </p:style>
+          <p:txBody>
+            <a:bodyPr rtlCol="0" anchor="ctr"/>
+            <a:lstStyle/>
+            <a:p>
+              <a:pPr algn="ctr"/>
+              <a:r>
+                <a:rPr lang="en-US" b="1" dirty="0">
+                  <a:solidFill>
+                    <a:schemeClr val="tx1"/>
+                  </a:solidFill>
+                </a:rPr>
+                <a:t>Harvest Slope over initial 20 years</a:t>
+              </a:r>
+            </a:p>
+          </p:txBody>
+        </p:sp>
+        <p:sp>
+          <p:nvSpPr>
+            <p:cNvPr id="16" name="Rectangle 15">
+              <a:extLst>
+                <a:ext uri="{FF2B5EF4-FFF2-40B4-BE49-F238E27FC236}">
+                  <a16:creationId xmlns:a16="http://schemas.microsoft.com/office/drawing/2014/main" id="{129E80C1-1F2B-49FD-B2ED-448242E8A737}"/>
+                </a:ext>
+              </a:extLst>
+            </p:cNvPr>
+            <p:cNvSpPr/>
+            <p:nvPr/>
+          </p:nvSpPr>
+          <p:spPr>
+            <a:xfrm>
+              <a:off x="1911177" y="-3254280"/>
+              <a:ext cx="4307181" cy="508769"/>
+            </a:xfrm>
+            <a:prstGeom prst="rect">
+              <a:avLst/>
+            </a:prstGeom>
+            <a:solidFill>
+              <a:srgbClr val="81A1B1"/>
+            </a:solidFill>
+            <a:ln>
+              <a:solidFill>
+                <a:schemeClr val="bg1"/>
+              </a:solidFill>
+            </a:ln>
+          </p:spPr>
+          <p:style>
+            <a:lnRef idx="2">
+              <a:schemeClr val="accent1">
+                <a:shade val="50000"/>
+              </a:schemeClr>
+            </a:lnRef>
+            <a:fillRef idx="1">
+              <a:schemeClr val="accent1"/>
+            </a:fillRef>
+            <a:effectRef idx="0">
+              <a:schemeClr val="accent1"/>
+            </a:effectRef>
+            <a:fontRef idx="minor">
+              <a:schemeClr val="lt1"/>
+            </a:fontRef>
+          </p:style>
+          <p:txBody>
+            <a:bodyPr rtlCol="0" anchor="ctr"/>
+            <a:lstStyle/>
+            <a:p>
+              <a:pPr algn="ctr"/>
+              <a:r>
+                <a:rPr lang="en-US" b="1" dirty="0">
+                  <a:solidFill>
+                    <a:schemeClr val="tx1"/>
+                  </a:solidFill>
+                </a:rPr>
+                <a:t>Fish Population Slope over initial 20 years</a:t>
+              </a:r>
+            </a:p>
+          </p:txBody>
+        </p:sp>
+        <p:pic>
+          <p:nvPicPr>
+            <p:cNvPr id="17" name="Picture 16" descr="Chart, bar chart&#10;&#10;Description automatically generated">
+              <a:extLst>
+                <a:ext uri="{FF2B5EF4-FFF2-40B4-BE49-F238E27FC236}">
+                  <a16:creationId xmlns:a16="http://schemas.microsoft.com/office/drawing/2014/main" id="{8583EBB3-224D-493A-B37C-727D8A899621}"/>
+                </a:ext>
+              </a:extLst>
+            </p:cNvPr>
+            <p:cNvPicPr>
+              <a:picLocks noChangeAspect="1"/>
+            </p:cNvPicPr>
+            <p:nvPr/>
+          </p:nvPicPr>
+          <p:blipFill rotWithShape="1">
+            <a:blip r:embed="rId4">
+              <a:extLst>
+                <a:ext uri="{28A0092B-C50C-407E-A947-70E740481C1C}">
+                  <a14:useLocalDpi xmlns:a14="http://schemas.microsoft.com/office/drawing/2010/main" val="0"/>
+                </a:ext>
+              </a:extLst>
+            </a:blip>
+            <a:srcRect l="83240" t="26431" r="1529" b="27964"/>
+            <a:stretch/>
+          </p:blipFill>
+          <p:spPr>
+            <a:xfrm>
+              <a:off x="6462584" y="7823487"/>
+              <a:ext cx="1481371" cy="4435678"/>
+            </a:xfrm>
+            <a:prstGeom prst="rect">
+              <a:avLst/>
+            </a:prstGeom>
+          </p:spPr>
+        </p:pic>
+        <p:pic>
+          <p:nvPicPr>
+            <p:cNvPr id="18" name="Picture 17" descr="Shape&#10;&#10;Description automatically generated">
+              <a:extLst>
+                <a:ext uri="{FF2B5EF4-FFF2-40B4-BE49-F238E27FC236}">
+                  <a16:creationId xmlns:a16="http://schemas.microsoft.com/office/drawing/2014/main" id="{3307E3E3-DE91-4394-B45A-4B60406D6210}"/>
+                </a:ext>
+              </a:extLst>
+            </p:cNvPr>
+            <p:cNvPicPr>
+              <a:picLocks noChangeAspect="1"/>
+            </p:cNvPicPr>
+            <p:nvPr/>
+          </p:nvPicPr>
+          <p:blipFill rotWithShape="1">
+            <a:blip r:embed="rId3">
+              <a:extLst>
+                <a:ext uri="{28A0092B-C50C-407E-A947-70E740481C1C}">
+                  <a14:useLocalDpi xmlns:a14="http://schemas.microsoft.com/office/drawing/2010/main" val="0"/>
+                </a:ext>
+              </a:extLst>
+            </a:blip>
+            <a:srcRect l="88507" t="24893" r="1657" b="29564"/>
+            <a:stretch/>
+          </p:blipFill>
+          <p:spPr>
+            <a:xfrm>
+              <a:off x="6487296" y="2374406"/>
+              <a:ext cx="946984" cy="4384748"/>
+            </a:xfrm>
+            <a:prstGeom prst="rect">
+              <a:avLst/>
+            </a:prstGeom>
+          </p:spPr>
+        </p:pic>
+        <p:pic>
+          <p:nvPicPr>
+            <p:cNvPr id="19" name="Picture 18" descr="Shape&#10;&#10;Description automatically generated">
+              <a:extLst>
+                <a:ext uri="{FF2B5EF4-FFF2-40B4-BE49-F238E27FC236}">
+                  <a16:creationId xmlns:a16="http://schemas.microsoft.com/office/drawing/2014/main" id="{C91B5B5E-2E97-4936-A39B-44EDF4DC2E77}"/>
+                </a:ext>
+              </a:extLst>
+            </p:cNvPr>
+            <p:cNvPicPr>
+              <a:picLocks noChangeAspect="1"/>
+            </p:cNvPicPr>
+            <p:nvPr/>
+          </p:nvPicPr>
+          <p:blipFill rotWithShape="1">
+            <a:blip r:embed="rId2">
+              <a:extLst>
+                <a:ext uri="{28A0092B-C50C-407E-A947-70E740481C1C}">
+                  <a14:useLocalDpi xmlns:a14="http://schemas.microsoft.com/office/drawing/2010/main" val="0"/>
+                </a:ext>
+              </a:extLst>
+            </a:blip>
+            <a:srcRect l="87654" t="25270" r="1920" b="28197"/>
+            <a:stretch/>
+          </p:blipFill>
+          <p:spPr>
+            <a:xfrm>
+              <a:off x="6549082" y="-2743139"/>
+              <a:ext cx="946984" cy="4226200"/>
+            </a:xfrm>
+            <a:prstGeom prst="rect">
+              <a:avLst/>
+            </a:prstGeom>
+          </p:spPr>
+        </p:pic>
+        <p:sp>
+          <p:nvSpPr>
+            <p:cNvPr id="21" name="Rectangle 20">
+              <a:extLst>
+                <a:ext uri="{FF2B5EF4-FFF2-40B4-BE49-F238E27FC236}">
+                  <a16:creationId xmlns:a16="http://schemas.microsoft.com/office/drawing/2014/main" id="{04C1F44E-99EC-4479-8C30-B190A9EBF1BC}"/>
+                </a:ext>
+              </a:extLst>
+            </p:cNvPr>
+            <p:cNvSpPr/>
+            <p:nvPr/>
+          </p:nvSpPr>
+          <p:spPr>
+            <a:xfrm>
+              <a:off x="1144242" y="-3204251"/>
+              <a:ext cx="445317" cy="408709"/>
+            </a:xfrm>
+            <a:prstGeom prst="rect">
+              <a:avLst/>
+            </a:prstGeom>
+            <a:solidFill>
+              <a:schemeClr val="bg1"/>
+            </a:solidFill>
+            <a:ln>
+              <a:solidFill>
+                <a:schemeClr val="bg1"/>
+              </a:solidFill>
+            </a:ln>
+          </p:spPr>
+          <p:style>
+            <a:lnRef idx="2">
+              <a:schemeClr val="accent1">
+                <a:shade val="50000"/>
+              </a:schemeClr>
+            </a:lnRef>
+            <a:fillRef idx="1">
+              <a:schemeClr val="accent1"/>
+            </a:fillRef>
+            <a:effectRef idx="0">
+              <a:schemeClr val="accent1"/>
+            </a:effectRef>
+            <a:fontRef idx="minor">
+              <a:schemeClr val="lt1"/>
+            </a:fontRef>
+          </p:style>
+          <p:txBody>
+            <a:bodyPr rtlCol="0" anchor="ctr"/>
+            <a:lstStyle/>
+            <a:p>
+              <a:pPr algn="ctr"/>
+              <a:r>
+                <a:rPr lang="en-US" b="1" dirty="0">
+                  <a:solidFill>
+                    <a:schemeClr val="tx1"/>
+                  </a:solidFill>
+                </a:rPr>
+                <a:t>A)</a:t>
+              </a:r>
+            </a:p>
+          </p:txBody>
+        </p:sp>
+        <p:sp>
+          <p:nvSpPr>
+            <p:cNvPr id="22" name="Rectangle 21">
+              <a:extLst>
+                <a:ext uri="{FF2B5EF4-FFF2-40B4-BE49-F238E27FC236}">
+                  <a16:creationId xmlns:a16="http://schemas.microsoft.com/office/drawing/2014/main" id="{36B167EA-0D20-4608-AEA9-2458D957B308}"/>
+                </a:ext>
+              </a:extLst>
+            </p:cNvPr>
+            <p:cNvSpPr/>
+            <p:nvPr/>
+          </p:nvSpPr>
+          <p:spPr>
+            <a:xfrm>
+              <a:off x="1144242" y="1820849"/>
+              <a:ext cx="445317" cy="408709"/>
+            </a:xfrm>
+            <a:prstGeom prst="rect">
+              <a:avLst/>
+            </a:prstGeom>
+            <a:solidFill>
+              <a:schemeClr val="bg1"/>
+            </a:solidFill>
+            <a:ln>
+              <a:solidFill>
+                <a:schemeClr val="bg1"/>
+              </a:solidFill>
+            </a:ln>
+          </p:spPr>
+          <p:style>
+            <a:lnRef idx="2">
+              <a:schemeClr val="accent1">
+                <a:shade val="50000"/>
+              </a:schemeClr>
+            </a:lnRef>
+            <a:fillRef idx="1">
+              <a:schemeClr val="accent1"/>
+            </a:fillRef>
+            <a:effectRef idx="0">
+              <a:schemeClr val="accent1"/>
+            </a:effectRef>
+            <a:fontRef idx="minor">
+              <a:schemeClr val="lt1"/>
+            </a:fontRef>
+          </p:style>
+          <p:txBody>
+            <a:bodyPr rtlCol="0" anchor="ctr"/>
+            <a:lstStyle/>
+            <a:p>
+              <a:pPr algn="ctr"/>
+              <a:r>
+                <a:rPr lang="en-US" b="1" dirty="0">
+                  <a:solidFill>
+                    <a:schemeClr val="tx1"/>
+                  </a:solidFill>
+                </a:rPr>
+                <a:t>B)</a:t>
+              </a:r>
+            </a:p>
+          </p:txBody>
+        </p:sp>
+        <p:sp>
+          <p:nvSpPr>
+            <p:cNvPr id="23" name="Rectangle 22">
+              <a:extLst>
+                <a:ext uri="{FF2B5EF4-FFF2-40B4-BE49-F238E27FC236}">
+                  <a16:creationId xmlns:a16="http://schemas.microsoft.com/office/drawing/2014/main" id="{C1AA1F1E-C206-4FC0-847F-57FEBF404054}"/>
+                </a:ext>
+              </a:extLst>
+            </p:cNvPr>
+            <p:cNvSpPr/>
+            <p:nvPr/>
+          </p:nvSpPr>
+          <p:spPr>
+            <a:xfrm>
+              <a:off x="1144242" y="6932034"/>
+              <a:ext cx="445317" cy="408709"/>
+            </a:xfrm>
+            <a:prstGeom prst="rect">
+              <a:avLst/>
+            </a:prstGeom>
+            <a:solidFill>
+              <a:schemeClr val="bg1"/>
+            </a:solidFill>
+            <a:ln>
+              <a:solidFill>
+                <a:schemeClr val="bg1"/>
+              </a:solidFill>
+            </a:ln>
+          </p:spPr>
+          <p:style>
+            <a:lnRef idx="2">
+              <a:schemeClr val="accent1">
+                <a:shade val="50000"/>
+              </a:schemeClr>
+            </a:lnRef>
+            <a:fillRef idx="1">
+              <a:schemeClr val="accent1"/>
+            </a:fillRef>
+            <a:effectRef idx="0">
+              <a:schemeClr val="accent1"/>
+            </a:effectRef>
+            <a:fontRef idx="minor">
+              <a:schemeClr val="lt1"/>
+            </a:fontRef>
+          </p:style>
+          <p:txBody>
+            <a:bodyPr rtlCol="0" anchor="ctr"/>
+            <a:lstStyle/>
+            <a:p>
+              <a:pPr algn="ctr"/>
+              <a:r>
+                <a:rPr lang="en-US" b="1" dirty="0">
+                  <a:solidFill>
+                    <a:schemeClr val="tx1"/>
+                  </a:solidFill>
+                </a:rPr>
+                <a:t>C)</a:t>
+              </a:r>
+            </a:p>
+          </p:txBody>
+        </p:sp>
+      </p:grpSp>
+    </p:spTree>
+    <p:extLst>
+      <p:ext uri="{BB962C8B-B14F-4D97-AF65-F5344CB8AC3E}">
+        <p14:creationId xmlns:p14="http://schemas.microsoft.com/office/powerpoint/2010/main" val="2731890195"/>
+      </p:ext>
+    </p:extLst>
+  </p:cSld>
+  <p:clrMapOvr>
+    <a:masterClrMapping/>
+  </p:clrMapOvr>
+</p:sld>
+</file>
+
+<file path=ppt/slides/slide16.xml><?xml version="1.0" encoding="utf-8"?>
+<p:sld xmlns:a="http://schemas.openxmlformats.org/drawingml/2006/main" xmlns:r="http://schemas.openxmlformats.org/officeDocument/2006/relationships" xmlns:p="http://schemas.openxmlformats.org/presentationml/2006/main">
+  <p:cSld>
+    <p:spTree>
+      <p:nvGrpSpPr>
+        <p:cNvPr id="1" name=""/>
+        <p:cNvGrpSpPr/>
+        <p:nvPr/>
+      </p:nvGrpSpPr>
+      <p:grpSpPr>
+        <a:xfrm>
+          <a:off x="0" y="0"/>
+          <a:ext cx="0" cy="0"/>
+          <a:chOff x="0" y="0"/>
+          <a:chExt cx="0" cy="0"/>
+        </a:xfrm>
+      </p:grpSpPr>
+      <p:pic>
+        <p:nvPicPr>
+          <p:cNvPr id="1026" name="Picture 2">
+            <a:extLst>
+              <a:ext uri="{FF2B5EF4-FFF2-40B4-BE49-F238E27FC236}">
+                <a16:creationId xmlns:a16="http://schemas.microsoft.com/office/drawing/2014/main" id="{6D9FBAB6-C9A2-4E7D-885E-7DC59623C84B}"/>
+              </a:ext>
+            </a:extLst>
+          </p:cNvPr>
+          <p:cNvPicPr>
+            <a:picLocks noChangeAspect="1" noChangeArrowheads="1"/>
+          </p:cNvPicPr>
+          <p:nvPr/>
+        </p:nvPicPr>
+        <p:blipFill>
+          <a:blip r:embed="rId2">
+            <a:extLst>
+              <a:ext uri="{28A0092B-C50C-407E-A947-70E740481C1C}">
+                <a14:useLocalDpi xmlns:a14="http://schemas.microsoft.com/office/drawing/2010/main" val="0"/>
+              </a:ext>
+            </a:extLst>
+          </a:blip>
+          <a:srcRect/>
+          <a:stretch>
+            <a:fillRect/>
+          </a:stretch>
+        </p:blipFill>
+        <p:spPr bwMode="auto">
+          <a:xfrm>
+            <a:off x="3148013" y="528638"/>
+            <a:ext cx="5895975" cy="5800725"/>
+          </a:xfrm>
+          <a:prstGeom prst="rect">
+            <a:avLst/>
+          </a:prstGeom>
+          <a:noFill/>
+          <a:extLst>
+            <a:ext uri="{909E8E84-426E-40DD-AFC4-6F175D3DCCD1}">
+              <a14:hiddenFill xmlns:a14="http://schemas.microsoft.com/office/drawing/2010/main">
+                <a:solidFill>
+                  <a:srgbClr val="FFFFFF"/>
+                </a:solidFill>
+              </a14:hiddenFill>
+            </a:ext>
+          </a:extLst>
+        </p:spPr>
+      </p:pic>
+    </p:spTree>
+    <p:extLst>
+      <p:ext uri="{BB962C8B-B14F-4D97-AF65-F5344CB8AC3E}">
+        <p14:creationId xmlns:p14="http://schemas.microsoft.com/office/powerpoint/2010/main" val="278972908"/>
+      </p:ext>
+    </p:extLst>
+  </p:cSld>
+  <p:clrMapOvr>
+    <a:masterClrMapping/>
+  </p:clrMapOvr>
+</p:sld>
+</file>
+
+<file path=ppt/slides/slide17.xml><?xml version="1.0" encoding="utf-8"?>
 <p:sld xmlns:a="http://schemas.openxmlformats.org/drawingml/2006/main" xmlns:r="http://schemas.openxmlformats.org/officeDocument/2006/relationships" xmlns:p="http://schemas.openxmlformats.org/presentationml/2006/main">
   <p:cSld>
     <p:spTree>
@@ -13741,140 +16139,12 @@
           <a:chExt cx="0" cy="0"/>
         </a:xfrm>
       </p:grpSpPr>
-      <p:grpSp>
-        <p:nvGrpSpPr>
-          <p:cNvPr id="10" name="Group 9">
+      <p:pic>
+        <p:nvPicPr>
+          <p:cNvPr id="2" name="Picture 1" descr="Chart, box and whisker chart&#10;&#10;Description automatically generated">
             <a:extLst>
               <a:ext uri="{FF2B5EF4-FFF2-40B4-BE49-F238E27FC236}">
-                <a16:creationId xmlns:a16="http://schemas.microsoft.com/office/drawing/2014/main" id="{B80A4323-15A7-43E2-B1F0-9C1A4F5FA670}"/>
-              </a:ext>
-            </a:extLst>
-          </p:cNvPr>
-          <p:cNvGrpSpPr/>
-          <p:nvPr/>
-        </p:nvGrpSpPr>
-        <p:grpSpPr>
-          <a:xfrm>
-            <a:off x="71047" y="0"/>
-            <a:ext cx="8197158" cy="6858000"/>
-            <a:chOff x="71047" y="0"/>
-            <a:chExt cx="8197158" cy="6858000"/>
-          </a:xfrm>
-        </p:grpSpPr>
-        <p:pic>
-          <p:nvPicPr>
-            <p:cNvPr id="7" name="Picture 6" descr="Shape&#10;&#10;Description automatically generated">
-              <a:extLst>
-                <a:ext uri="{FF2B5EF4-FFF2-40B4-BE49-F238E27FC236}">
-                  <a16:creationId xmlns:a16="http://schemas.microsoft.com/office/drawing/2014/main" id="{B5E2B5A2-E21C-4BB3-91E0-447126E9FCFF}"/>
-                </a:ext>
-              </a:extLst>
-            </p:cNvPr>
-            <p:cNvPicPr>
-              <a:picLocks noChangeAspect="1"/>
-            </p:cNvPicPr>
-            <p:nvPr/>
-          </p:nvPicPr>
-          <p:blipFill>
-            <a:blip r:embed="rId2">
-              <a:extLst>
-                <a:ext uri="{28A0092B-C50C-407E-A947-70E740481C1C}">
-                  <a14:useLocalDpi xmlns:a14="http://schemas.microsoft.com/office/drawing/2010/main" val="0"/>
-                </a:ext>
-              </a:extLst>
-            </a:blip>
-            <a:stretch>
-              <a:fillRect/>
-            </a:stretch>
-          </p:blipFill>
-          <p:spPr>
-            <a:xfrm>
-              <a:off x="71047" y="2697755"/>
-              <a:ext cx="4160245" cy="4160245"/>
-            </a:xfrm>
-            <a:prstGeom prst="rect">
-              <a:avLst/>
-            </a:prstGeom>
-          </p:spPr>
-        </p:pic>
-        <p:pic>
-          <p:nvPicPr>
-            <p:cNvPr id="5" name="Picture 4" descr="Chart&#10;&#10;Description automatically generated">
-              <a:extLst>
-                <a:ext uri="{FF2B5EF4-FFF2-40B4-BE49-F238E27FC236}">
-                  <a16:creationId xmlns:a16="http://schemas.microsoft.com/office/drawing/2014/main" id="{62212AF3-1643-4B8E-ACA4-A40C6C4015DB}"/>
-                </a:ext>
-              </a:extLst>
-            </p:cNvPr>
-            <p:cNvPicPr>
-              <a:picLocks noChangeAspect="1"/>
-            </p:cNvPicPr>
-            <p:nvPr/>
-          </p:nvPicPr>
-          <p:blipFill rotWithShape="1">
-            <a:blip r:embed="rId3">
-              <a:extLst>
-                <a:ext uri="{28A0092B-C50C-407E-A947-70E740481C1C}">
-                  <a14:useLocalDpi xmlns:a14="http://schemas.microsoft.com/office/drawing/2010/main" val="0"/>
-                </a:ext>
-              </a:extLst>
-            </a:blip>
-            <a:srcRect t="18260" r="21074" b="20630"/>
-            <a:stretch/>
-          </p:blipFill>
-          <p:spPr>
-            <a:xfrm>
-              <a:off x="71047" y="0"/>
-              <a:ext cx="3858430" cy="2987420"/>
-            </a:xfrm>
-            <a:prstGeom prst="rect">
-              <a:avLst/>
-            </a:prstGeom>
-          </p:spPr>
-        </p:pic>
-        <p:pic>
-          <p:nvPicPr>
-            <p:cNvPr id="9" name="Picture 8" descr="Chart, bar chart&#10;&#10;Description automatically generated">
-              <a:extLst>
-                <a:ext uri="{FF2B5EF4-FFF2-40B4-BE49-F238E27FC236}">
-                  <a16:creationId xmlns:a16="http://schemas.microsoft.com/office/drawing/2014/main" id="{3F2BA2C2-436E-40A8-A450-829600676AE7}"/>
-                </a:ext>
-              </a:extLst>
-            </p:cNvPr>
-            <p:cNvPicPr>
-              <a:picLocks noChangeAspect="1"/>
-            </p:cNvPicPr>
-            <p:nvPr/>
-          </p:nvPicPr>
-          <p:blipFill>
-            <a:blip r:embed="rId4">
-              <a:extLst>
-                <a:ext uri="{28A0092B-C50C-407E-A947-70E740481C1C}">
-                  <a14:useLocalDpi xmlns:a14="http://schemas.microsoft.com/office/drawing/2010/main" val="0"/>
-                </a:ext>
-              </a:extLst>
-            </a:blip>
-            <a:stretch>
-              <a:fillRect/>
-            </a:stretch>
-          </p:blipFill>
-          <p:spPr>
-            <a:xfrm>
-              <a:off x="4091151" y="151940"/>
-              <a:ext cx="4177054" cy="4177054"/>
-            </a:xfrm>
-            <a:prstGeom prst="rect">
-              <a:avLst/>
-            </a:prstGeom>
-          </p:spPr>
-        </p:pic>
-      </p:grpSp>
-      <p:pic>
-        <p:nvPicPr>
-          <p:cNvPr id="3" name="Picture 2" descr="Chart, shape&#10;&#10;Description automatically generated">
-            <a:extLst>
-              <a:ext uri="{FF2B5EF4-FFF2-40B4-BE49-F238E27FC236}">
-                <a16:creationId xmlns:a16="http://schemas.microsoft.com/office/drawing/2014/main" id="{48070633-C0F3-47AD-949F-E9885420C3E3}"/>
+                <a16:creationId xmlns:a16="http://schemas.microsoft.com/office/drawing/2014/main" id="{75D5060B-271B-40AD-9C90-5B114761FB88}"/>
               </a:ext>
             </a:extLst>
           </p:cNvPr>
@@ -13884,20 +16154,160 @@
           <p:nvPr/>
         </p:nvPicPr>
         <p:blipFill rotWithShape="1">
-          <a:blip r:embed="rId5">
+          <a:blip r:embed="rId2">
             <a:extLst>
               <a:ext uri="{28A0092B-C50C-407E-A947-70E740481C1C}">
                 <a14:useLocalDpi xmlns:a14="http://schemas.microsoft.com/office/drawing/2010/main" val="0"/>
               </a:ext>
             </a:extLst>
           </a:blip>
-          <a:srcRect t="9622"/>
+          <a:srcRect l="4432" t="447" r="74716" b="91172"/>
           <a:stretch/>
         </p:blipFill>
         <p:spPr>
           <a:xfrm>
-            <a:off x="8358634" y="-166079"/>
-            <a:ext cx="2479007" cy="2240467"/>
+            <a:off x="381000" y="193963"/>
+            <a:ext cx="2542309" cy="408709"/>
+          </a:xfrm>
+          <a:prstGeom prst="rect">
+            <a:avLst/>
+          </a:prstGeom>
+        </p:spPr>
+      </p:pic>
+      <p:pic>
+        <p:nvPicPr>
+          <p:cNvPr id="3" name="Picture 2" descr="Chart, box and whisker chart&#10;&#10;Description automatically generated">
+            <a:extLst>
+              <a:ext uri="{FF2B5EF4-FFF2-40B4-BE49-F238E27FC236}">
+                <a16:creationId xmlns:a16="http://schemas.microsoft.com/office/drawing/2014/main" id="{484C2B50-AEC5-4DD6-A9F6-926E92676042}"/>
+              </a:ext>
+            </a:extLst>
+          </p:cNvPr>
+          <p:cNvPicPr>
+            <a:picLocks noChangeAspect="1"/>
+          </p:cNvPicPr>
+          <p:nvPr/>
+        </p:nvPicPr>
+        <p:blipFill rotWithShape="1">
+          <a:blip r:embed="rId2">
+            <a:extLst>
+              <a:ext uri="{28A0092B-C50C-407E-A947-70E740481C1C}">
+                <a14:useLocalDpi xmlns:a14="http://schemas.microsoft.com/office/drawing/2010/main" val="0"/>
+              </a:ext>
+            </a:extLst>
+          </a:blip>
+          <a:srcRect l="89489" t="40504" b="37479"/>
+          <a:stretch/>
+        </p:blipFill>
+        <p:spPr>
+          <a:xfrm>
+            <a:off x="10806546" y="193963"/>
+            <a:ext cx="1281544" cy="1073727"/>
+          </a:xfrm>
+          <a:prstGeom prst="rect">
+            <a:avLst/>
+          </a:prstGeom>
+        </p:spPr>
+      </p:pic>
+      <p:pic>
+        <p:nvPicPr>
+          <p:cNvPr id="4" name="Picture 3" descr="Chart, box and whisker chart&#10;&#10;Description automatically generated">
+            <a:extLst>
+              <a:ext uri="{FF2B5EF4-FFF2-40B4-BE49-F238E27FC236}">
+                <a16:creationId xmlns:a16="http://schemas.microsoft.com/office/drawing/2014/main" id="{8D25C95B-68B9-4C35-9C48-B38E97F7ECCC}"/>
+              </a:ext>
+            </a:extLst>
+          </p:cNvPr>
+          <p:cNvPicPr>
+            <a:picLocks noChangeAspect="1"/>
+          </p:cNvPicPr>
+          <p:nvPr/>
+        </p:nvPicPr>
+        <p:blipFill rotWithShape="1">
+          <a:blip r:embed="rId2">
+            <a:extLst>
+              <a:ext uri="{28A0092B-C50C-407E-A947-70E740481C1C}">
+                <a14:useLocalDpi xmlns:a14="http://schemas.microsoft.com/office/drawing/2010/main" val="0"/>
+              </a:ext>
+            </a:extLst>
+          </a:blip>
+          <a:srcRect l="25227" t="447" r="53920" b="91172"/>
+          <a:stretch/>
+        </p:blipFill>
+        <p:spPr>
+          <a:xfrm>
+            <a:off x="3051464" y="193962"/>
+            <a:ext cx="2542309" cy="408709"/>
+          </a:xfrm>
+          <a:prstGeom prst="rect">
+            <a:avLst/>
+          </a:prstGeom>
+        </p:spPr>
+      </p:pic>
+      <p:pic>
+        <p:nvPicPr>
+          <p:cNvPr id="5" name="Picture 4" descr="Chart, box and whisker chart&#10;&#10;Description automatically generated">
+            <a:extLst>
+              <a:ext uri="{FF2B5EF4-FFF2-40B4-BE49-F238E27FC236}">
+                <a16:creationId xmlns:a16="http://schemas.microsoft.com/office/drawing/2014/main" id="{88D50D3D-FDA9-44E0-9F07-B1CA52694D9B}"/>
+              </a:ext>
+            </a:extLst>
+          </p:cNvPr>
+          <p:cNvPicPr>
+            <a:picLocks noChangeAspect="1"/>
+          </p:cNvPicPr>
+          <p:nvPr/>
+        </p:nvPicPr>
+        <p:blipFill rotWithShape="1">
+          <a:blip r:embed="rId2">
+            <a:extLst>
+              <a:ext uri="{28A0092B-C50C-407E-A947-70E740481C1C}">
+                <a14:useLocalDpi xmlns:a14="http://schemas.microsoft.com/office/drawing/2010/main" val="0"/>
+              </a:ext>
+            </a:extLst>
+          </a:blip>
+          <a:srcRect l="46250" t="447" r="32841" b="91172"/>
+          <a:stretch/>
+        </p:blipFill>
+        <p:spPr>
+          <a:xfrm>
+            <a:off x="3283526" y="1122217"/>
+            <a:ext cx="2549237" cy="408709"/>
+          </a:xfrm>
+          <a:prstGeom prst="rect">
+            <a:avLst/>
+          </a:prstGeom>
+        </p:spPr>
+      </p:pic>
+      <p:pic>
+        <p:nvPicPr>
+          <p:cNvPr id="6" name="Picture 5" descr="Chart, box and whisker chart&#10;&#10;Description automatically generated">
+            <a:extLst>
+              <a:ext uri="{FF2B5EF4-FFF2-40B4-BE49-F238E27FC236}">
+                <a16:creationId xmlns:a16="http://schemas.microsoft.com/office/drawing/2014/main" id="{8F53B87B-15C4-4458-9278-1AE4CAFBC5FF}"/>
+              </a:ext>
+            </a:extLst>
+          </p:cNvPr>
+          <p:cNvPicPr>
+            <a:picLocks noChangeAspect="1"/>
+          </p:cNvPicPr>
+          <p:nvPr/>
+        </p:nvPicPr>
+        <p:blipFill rotWithShape="1">
+          <a:blip r:embed="rId2">
+            <a:extLst>
+              <a:ext uri="{28A0092B-C50C-407E-A947-70E740481C1C}">
+                <a14:useLocalDpi xmlns:a14="http://schemas.microsoft.com/office/drawing/2010/main" val="0"/>
+              </a:ext>
+            </a:extLst>
+          </a:blip>
+          <a:srcRect l="67216" t="1158" r="11875" b="91172"/>
+          <a:stretch/>
+        </p:blipFill>
+        <p:spPr>
+          <a:xfrm>
+            <a:off x="6359239" y="1122217"/>
+            <a:ext cx="2549237" cy="374072"/>
           </a:xfrm>
           <a:prstGeom prst="rect">
             <a:avLst/>
@@ -13907,7 +16317,7 @@
     </p:spTree>
     <p:extLst>
       <p:ext uri="{BB962C8B-B14F-4D97-AF65-F5344CB8AC3E}">
-        <p14:creationId xmlns:p14="http://schemas.microsoft.com/office/powerpoint/2010/main" val="2037376003"/>
+        <p14:creationId xmlns:p14="http://schemas.microsoft.com/office/powerpoint/2010/main" val="4066135035"/>
       </p:ext>
     </p:extLst>
   </p:cSld>
@@ -13934,607 +16344,118 @@
           <a:chExt cx="0" cy="0"/>
         </a:xfrm>
       </p:grpSpPr>
-      <p:grpSp>
-        <p:nvGrpSpPr>
-          <p:cNvPr id="24" name="Group 23">
+      <p:pic>
+        <p:nvPicPr>
+          <p:cNvPr id="3" name="Picture 2" descr="Chart&#10;&#10;Description automatically generated">
             <a:extLst>
               <a:ext uri="{FF2B5EF4-FFF2-40B4-BE49-F238E27FC236}">
-                <a16:creationId xmlns:a16="http://schemas.microsoft.com/office/drawing/2014/main" id="{FDA38EA0-E292-4FD6-922B-9E7AD7B5ED44}"/>
+                <a16:creationId xmlns:a16="http://schemas.microsoft.com/office/drawing/2014/main" id="{F6A71E36-4F33-4907-BA0D-76526A5FCFEA}"/>
               </a:ext>
             </a:extLst>
           </p:cNvPr>
-          <p:cNvGrpSpPr/>
+          <p:cNvPicPr>
+            <a:picLocks noChangeAspect="1"/>
+          </p:cNvPicPr>
           <p:nvPr/>
-        </p:nvGrpSpPr>
-        <p:grpSpPr>
+        </p:nvPicPr>
+        <p:blipFill>
+          <a:blip r:embed="rId2">
+            <a:extLst>
+              <a:ext uri="{28A0092B-C50C-407E-A947-70E740481C1C}">
+                <a14:useLocalDpi xmlns:a14="http://schemas.microsoft.com/office/drawing/2010/main" val="0"/>
+              </a:ext>
+            </a:extLst>
+          </a:blip>
+          <a:stretch>
+            <a:fillRect/>
+          </a:stretch>
+        </p:blipFill>
+        <p:spPr>
           <a:xfrm>
-            <a:off x="1113844" y="-3311613"/>
-            <a:ext cx="6830111" cy="17114124"/>
-            <a:chOff x="1113844" y="-3311613"/>
-            <a:chExt cx="6830111" cy="17114124"/>
+            <a:off x="2972590" y="1600196"/>
+            <a:ext cx="4572009" cy="3657607"/>
           </a:xfrm>
-        </p:grpSpPr>
-        <p:pic>
-          <p:nvPicPr>
-            <p:cNvPr id="7" name="Picture 6" descr="Shape&#10;&#10;Description automatically generated">
-              <a:extLst>
-                <a:ext uri="{FF2B5EF4-FFF2-40B4-BE49-F238E27FC236}">
-                  <a16:creationId xmlns:a16="http://schemas.microsoft.com/office/drawing/2014/main" id="{CF73D72A-8976-4B04-BA4A-E23C2D4E731D}"/>
-                </a:ext>
-              </a:extLst>
-            </p:cNvPr>
-            <p:cNvPicPr>
-              <a:picLocks noChangeAspect="1"/>
-            </p:cNvPicPr>
-            <p:nvPr/>
-          </p:nvPicPr>
-          <p:blipFill rotWithShape="1">
-            <a:blip r:embed="rId2">
-              <a:extLst>
-                <a:ext uri="{28A0092B-C50C-407E-A947-70E740481C1C}">
-                  <a14:useLocalDpi xmlns:a14="http://schemas.microsoft.com/office/drawing/2010/main" val="0"/>
-                </a:ext>
-              </a:extLst>
-            </a:blip>
-            <a:srcRect r="14451"/>
-            <a:stretch/>
-          </p:blipFill>
-          <p:spPr>
-            <a:xfrm>
-              <a:off x="1149106" y="-3311613"/>
-              <a:ext cx="5202267" cy="6081029"/>
-            </a:xfrm>
-            <a:prstGeom prst="rect">
-              <a:avLst/>
-            </a:prstGeom>
-          </p:spPr>
-        </p:pic>
-        <p:pic>
-          <p:nvPicPr>
-            <p:cNvPr id="10" name="Picture 9" descr="Shape&#10;&#10;Description automatically generated">
-              <a:extLst>
-                <a:ext uri="{FF2B5EF4-FFF2-40B4-BE49-F238E27FC236}">
-                  <a16:creationId xmlns:a16="http://schemas.microsoft.com/office/drawing/2014/main" id="{D4B8190B-DF2E-4153-889F-EDDB1A5A808F}"/>
-                </a:ext>
-              </a:extLst>
-            </p:cNvPr>
-            <p:cNvPicPr>
-              <a:picLocks noChangeAspect="1"/>
-            </p:cNvPicPr>
-            <p:nvPr/>
-          </p:nvPicPr>
-          <p:blipFill rotWithShape="1">
-            <a:blip r:embed="rId3">
-              <a:extLst>
-                <a:ext uri="{28A0092B-C50C-407E-A947-70E740481C1C}">
-                  <a14:useLocalDpi xmlns:a14="http://schemas.microsoft.com/office/drawing/2010/main" val="0"/>
-                </a:ext>
-              </a:extLst>
-            </a:blip>
-            <a:srcRect t="9292" r="13266" b="16139"/>
-            <a:stretch/>
-          </p:blipFill>
-          <p:spPr>
-            <a:xfrm>
-              <a:off x="1144242" y="2285600"/>
-              <a:ext cx="5318342" cy="4572400"/>
-            </a:xfrm>
-            <a:prstGeom prst="rect">
-              <a:avLst/>
-            </a:prstGeom>
-          </p:spPr>
-        </p:pic>
-        <p:pic>
-          <p:nvPicPr>
-            <p:cNvPr id="12" name="Picture 11" descr="Chart, bar chart&#10;&#10;Description automatically generated">
-              <a:extLst>
-                <a:ext uri="{FF2B5EF4-FFF2-40B4-BE49-F238E27FC236}">
-                  <a16:creationId xmlns:a16="http://schemas.microsoft.com/office/drawing/2014/main" id="{AFBD0492-BE67-4CE6-B7B4-CD45722F61B7}"/>
-                </a:ext>
-              </a:extLst>
-            </p:cNvPr>
-            <p:cNvPicPr>
-              <a:picLocks noChangeAspect="1"/>
-            </p:cNvPicPr>
-            <p:nvPr/>
-          </p:nvPicPr>
-          <p:blipFill rotWithShape="1">
-            <a:blip r:embed="rId4">
-              <a:extLst>
-                <a:ext uri="{28A0092B-C50C-407E-A947-70E740481C1C}">
-                  <a14:useLocalDpi xmlns:a14="http://schemas.microsoft.com/office/drawing/2010/main" val="0"/>
-                </a:ext>
-              </a:extLst>
-            </a:blip>
-            <a:srcRect t="1179" r="20124"/>
-            <a:stretch/>
-          </p:blipFill>
-          <p:spPr>
-            <a:xfrm>
-              <a:off x="1113844" y="7322818"/>
-              <a:ext cx="5237529" cy="6479693"/>
-            </a:xfrm>
-            <a:prstGeom prst="rect">
-              <a:avLst/>
-            </a:prstGeom>
-          </p:spPr>
-        </p:pic>
-        <p:sp>
-          <p:nvSpPr>
-            <p:cNvPr id="14" name="Rectangle 13">
-              <a:extLst>
-                <a:ext uri="{FF2B5EF4-FFF2-40B4-BE49-F238E27FC236}">
-                  <a16:creationId xmlns:a16="http://schemas.microsoft.com/office/drawing/2014/main" id="{910149E6-9285-4B73-BC64-B0B9EBFDEE6D}"/>
-                </a:ext>
-              </a:extLst>
-            </p:cNvPr>
-            <p:cNvSpPr/>
-            <p:nvPr/>
-          </p:nvSpPr>
-          <p:spPr>
-            <a:xfrm>
-              <a:off x="1911177" y="6870353"/>
-              <a:ext cx="4307181" cy="508769"/>
-            </a:xfrm>
-            <a:prstGeom prst="rect">
-              <a:avLst/>
-            </a:prstGeom>
-            <a:solidFill>
-              <a:srgbClr val="81A1B1"/>
-            </a:solidFill>
-            <a:ln>
-              <a:solidFill>
-                <a:schemeClr val="bg1"/>
-              </a:solidFill>
-            </a:ln>
-          </p:spPr>
-          <p:style>
-            <a:lnRef idx="2">
-              <a:schemeClr val="accent1">
-                <a:shade val="50000"/>
-              </a:schemeClr>
-            </a:lnRef>
-            <a:fillRef idx="1">
-              <a:schemeClr val="accent1"/>
-            </a:fillRef>
-            <a:effectRef idx="0">
-              <a:schemeClr val="accent1"/>
-            </a:effectRef>
-            <a:fontRef idx="minor">
-              <a:schemeClr val="lt1"/>
-            </a:fontRef>
-          </p:style>
-          <p:txBody>
-            <a:bodyPr rtlCol="0" anchor="ctr"/>
-            <a:lstStyle/>
-            <a:p>
-              <a:pPr algn="ctr"/>
-              <a:r>
-                <a:rPr lang="en-US" b="1" dirty="0">
-                  <a:solidFill>
-                    <a:schemeClr val="tx1"/>
-                  </a:solidFill>
-                </a:rPr>
-                <a:t>Lambda Slope over initial 20 years</a:t>
-              </a:r>
-            </a:p>
-          </p:txBody>
-        </p:sp>
-        <p:sp>
-          <p:nvSpPr>
-            <p:cNvPr id="15" name="Rectangle 14">
-              <a:extLst>
-                <a:ext uri="{FF2B5EF4-FFF2-40B4-BE49-F238E27FC236}">
-                  <a16:creationId xmlns:a16="http://schemas.microsoft.com/office/drawing/2014/main" id="{8AA17C0F-344A-4CD0-8DB7-A30DB199043B}"/>
-                </a:ext>
-              </a:extLst>
-            </p:cNvPr>
-            <p:cNvSpPr/>
-            <p:nvPr/>
-          </p:nvSpPr>
-          <p:spPr>
-            <a:xfrm>
-              <a:off x="1911177" y="1770820"/>
-              <a:ext cx="4307181" cy="508769"/>
-            </a:xfrm>
-            <a:prstGeom prst="rect">
-              <a:avLst/>
-            </a:prstGeom>
-            <a:solidFill>
-              <a:srgbClr val="81A1B1"/>
-            </a:solidFill>
-            <a:ln>
-              <a:solidFill>
-                <a:schemeClr val="bg1"/>
-              </a:solidFill>
-            </a:ln>
-          </p:spPr>
-          <p:style>
-            <a:lnRef idx="2">
-              <a:schemeClr val="accent1">
-                <a:shade val="50000"/>
-              </a:schemeClr>
-            </a:lnRef>
-            <a:fillRef idx="1">
-              <a:schemeClr val="accent1"/>
-            </a:fillRef>
-            <a:effectRef idx="0">
-              <a:schemeClr val="accent1"/>
-            </a:effectRef>
-            <a:fontRef idx="minor">
-              <a:schemeClr val="lt1"/>
-            </a:fontRef>
-          </p:style>
-          <p:txBody>
-            <a:bodyPr rtlCol="0" anchor="ctr"/>
-            <a:lstStyle/>
-            <a:p>
-              <a:pPr algn="ctr"/>
-              <a:r>
-                <a:rPr lang="en-US" b="1" dirty="0">
-                  <a:solidFill>
-                    <a:schemeClr val="tx1"/>
-                  </a:solidFill>
-                </a:rPr>
-                <a:t>Harvest Slope over initial 20 years</a:t>
-              </a:r>
-            </a:p>
-          </p:txBody>
-        </p:sp>
-        <p:sp>
-          <p:nvSpPr>
-            <p:cNvPr id="16" name="Rectangle 15">
-              <a:extLst>
-                <a:ext uri="{FF2B5EF4-FFF2-40B4-BE49-F238E27FC236}">
-                  <a16:creationId xmlns:a16="http://schemas.microsoft.com/office/drawing/2014/main" id="{129E80C1-1F2B-49FD-B2ED-448242E8A737}"/>
-                </a:ext>
-              </a:extLst>
-            </p:cNvPr>
-            <p:cNvSpPr/>
-            <p:nvPr/>
-          </p:nvSpPr>
-          <p:spPr>
-            <a:xfrm>
-              <a:off x="1911177" y="-3254280"/>
-              <a:ext cx="4307181" cy="508769"/>
-            </a:xfrm>
-            <a:prstGeom prst="rect">
-              <a:avLst/>
-            </a:prstGeom>
-            <a:solidFill>
-              <a:srgbClr val="81A1B1"/>
-            </a:solidFill>
-            <a:ln>
-              <a:solidFill>
-                <a:schemeClr val="bg1"/>
-              </a:solidFill>
-            </a:ln>
-          </p:spPr>
-          <p:style>
-            <a:lnRef idx="2">
-              <a:schemeClr val="accent1">
-                <a:shade val="50000"/>
-              </a:schemeClr>
-            </a:lnRef>
-            <a:fillRef idx="1">
-              <a:schemeClr val="accent1"/>
-            </a:fillRef>
-            <a:effectRef idx="0">
-              <a:schemeClr val="accent1"/>
-            </a:effectRef>
-            <a:fontRef idx="minor">
-              <a:schemeClr val="lt1"/>
-            </a:fontRef>
-          </p:style>
-          <p:txBody>
-            <a:bodyPr rtlCol="0" anchor="ctr"/>
-            <a:lstStyle/>
-            <a:p>
-              <a:pPr algn="ctr"/>
-              <a:r>
-                <a:rPr lang="en-US" b="1" dirty="0">
-                  <a:solidFill>
-                    <a:schemeClr val="tx1"/>
-                  </a:solidFill>
-                </a:rPr>
-                <a:t>Fish Population Slope over initial 20 years</a:t>
-              </a:r>
-            </a:p>
-          </p:txBody>
-        </p:sp>
-        <p:pic>
-          <p:nvPicPr>
-            <p:cNvPr id="17" name="Picture 16" descr="Chart, bar chart&#10;&#10;Description automatically generated">
-              <a:extLst>
-                <a:ext uri="{FF2B5EF4-FFF2-40B4-BE49-F238E27FC236}">
-                  <a16:creationId xmlns:a16="http://schemas.microsoft.com/office/drawing/2014/main" id="{8583EBB3-224D-493A-B37C-727D8A899621}"/>
-                </a:ext>
-              </a:extLst>
-            </p:cNvPr>
-            <p:cNvPicPr>
-              <a:picLocks noChangeAspect="1"/>
-            </p:cNvPicPr>
-            <p:nvPr/>
-          </p:nvPicPr>
-          <p:blipFill rotWithShape="1">
-            <a:blip r:embed="rId4">
-              <a:extLst>
-                <a:ext uri="{28A0092B-C50C-407E-A947-70E740481C1C}">
-                  <a14:useLocalDpi xmlns:a14="http://schemas.microsoft.com/office/drawing/2010/main" val="0"/>
-                </a:ext>
-              </a:extLst>
-            </a:blip>
-            <a:srcRect l="83240" t="26431" r="1529" b="27964"/>
-            <a:stretch/>
-          </p:blipFill>
-          <p:spPr>
-            <a:xfrm>
-              <a:off x="6462584" y="7823487"/>
-              <a:ext cx="1481371" cy="4435678"/>
-            </a:xfrm>
-            <a:prstGeom prst="rect">
-              <a:avLst/>
-            </a:prstGeom>
-          </p:spPr>
-        </p:pic>
-        <p:pic>
-          <p:nvPicPr>
-            <p:cNvPr id="18" name="Picture 17" descr="Shape&#10;&#10;Description automatically generated">
-              <a:extLst>
-                <a:ext uri="{FF2B5EF4-FFF2-40B4-BE49-F238E27FC236}">
-                  <a16:creationId xmlns:a16="http://schemas.microsoft.com/office/drawing/2014/main" id="{3307E3E3-DE91-4394-B45A-4B60406D6210}"/>
-                </a:ext>
-              </a:extLst>
-            </p:cNvPr>
-            <p:cNvPicPr>
-              <a:picLocks noChangeAspect="1"/>
-            </p:cNvPicPr>
-            <p:nvPr/>
-          </p:nvPicPr>
-          <p:blipFill rotWithShape="1">
-            <a:blip r:embed="rId3">
-              <a:extLst>
-                <a:ext uri="{28A0092B-C50C-407E-A947-70E740481C1C}">
-                  <a14:useLocalDpi xmlns:a14="http://schemas.microsoft.com/office/drawing/2010/main" val="0"/>
-                </a:ext>
-              </a:extLst>
-            </a:blip>
-            <a:srcRect l="88507" t="24893" r="1657" b="29564"/>
-            <a:stretch/>
-          </p:blipFill>
-          <p:spPr>
-            <a:xfrm>
-              <a:off x="6487296" y="2374406"/>
-              <a:ext cx="946984" cy="4384748"/>
-            </a:xfrm>
-            <a:prstGeom prst="rect">
-              <a:avLst/>
-            </a:prstGeom>
-          </p:spPr>
-        </p:pic>
-        <p:pic>
-          <p:nvPicPr>
-            <p:cNvPr id="19" name="Picture 18" descr="Shape&#10;&#10;Description automatically generated">
-              <a:extLst>
-                <a:ext uri="{FF2B5EF4-FFF2-40B4-BE49-F238E27FC236}">
-                  <a16:creationId xmlns:a16="http://schemas.microsoft.com/office/drawing/2014/main" id="{C91B5B5E-2E97-4936-A39B-44EDF4DC2E77}"/>
-                </a:ext>
-              </a:extLst>
-            </p:cNvPr>
-            <p:cNvPicPr>
-              <a:picLocks noChangeAspect="1"/>
-            </p:cNvPicPr>
-            <p:nvPr/>
-          </p:nvPicPr>
-          <p:blipFill rotWithShape="1">
-            <a:blip r:embed="rId2">
-              <a:extLst>
-                <a:ext uri="{28A0092B-C50C-407E-A947-70E740481C1C}">
-                  <a14:useLocalDpi xmlns:a14="http://schemas.microsoft.com/office/drawing/2010/main" val="0"/>
-                </a:ext>
-              </a:extLst>
-            </a:blip>
-            <a:srcRect l="87654" t="25270" r="1920" b="28197"/>
-            <a:stretch/>
-          </p:blipFill>
-          <p:spPr>
-            <a:xfrm>
-              <a:off x="6549082" y="-2743139"/>
-              <a:ext cx="946984" cy="4226200"/>
-            </a:xfrm>
-            <a:prstGeom prst="rect">
-              <a:avLst/>
-            </a:prstGeom>
-          </p:spPr>
-        </p:pic>
-        <p:sp>
-          <p:nvSpPr>
-            <p:cNvPr id="21" name="Rectangle 20">
-              <a:extLst>
-                <a:ext uri="{FF2B5EF4-FFF2-40B4-BE49-F238E27FC236}">
-                  <a16:creationId xmlns:a16="http://schemas.microsoft.com/office/drawing/2014/main" id="{04C1F44E-99EC-4479-8C30-B190A9EBF1BC}"/>
-                </a:ext>
-              </a:extLst>
-            </p:cNvPr>
-            <p:cNvSpPr/>
-            <p:nvPr/>
-          </p:nvSpPr>
-          <p:spPr>
-            <a:xfrm>
-              <a:off x="1144242" y="-3204251"/>
-              <a:ext cx="445317" cy="408709"/>
-            </a:xfrm>
-            <a:prstGeom prst="rect">
-              <a:avLst/>
-            </a:prstGeom>
-            <a:solidFill>
-              <a:schemeClr val="bg1"/>
-            </a:solidFill>
-            <a:ln>
-              <a:solidFill>
-                <a:schemeClr val="bg1"/>
-              </a:solidFill>
-            </a:ln>
-          </p:spPr>
-          <p:style>
-            <a:lnRef idx="2">
-              <a:schemeClr val="accent1">
-                <a:shade val="50000"/>
-              </a:schemeClr>
-            </a:lnRef>
-            <a:fillRef idx="1">
-              <a:schemeClr val="accent1"/>
-            </a:fillRef>
-            <a:effectRef idx="0">
-              <a:schemeClr val="accent1"/>
-            </a:effectRef>
-            <a:fontRef idx="minor">
-              <a:schemeClr val="lt1"/>
-            </a:fontRef>
-          </p:style>
-          <p:txBody>
-            <a:bodyPr rtlCol="0" anchor="ctr"/>
-            <a:lstStyle/>
-            <a:p>
-              <a:pPr algn="ctr"/>
-              <a:r>
-                <a:rPr lang="en-US" b="1" dirty="0">
-                  <a:solidFill>
-                    <a:schemeClr val="tx1"/>
-                  </a:solidFill>
-                </a:rPr>
-                <a:t>A)</a:t>
-              </a:r>
-            </a:p>
-          </p:txBody>
-        </p:sp>
-        <p:sp>
-          <p:nvSpPr>
-            <p:cNvPr id="22" name="Rectangle 21">
-              <a:extLst>
-                <a:ext uri="{FF2B5EF4-FFF2-40B4-BE49-F238E27FC236}">
-                  <a16:creationId xmlns:a16="http://schemas.microsoft.com/office/drawing/2014/main" id="{36B167EA-0D20-4608-AEA9-2458D957B308}"/>
-                </a:ext>
-              </a:extLst>
-            </p:cNvPr>
-            <p:cNvSpPr/>
-            <p:nvPr/>
-          </p:nvSpPr>
-          <p:spPr>
-            <a:xfrm>
-              <a:off x="1144242" y="1820849"/>
-              <a:ext cx="445317" cy="408709"/>
-            </a:xfrm>
-            <a:prstGeom prst="rect">
-              <a:avLst/>
-            </a:prstGeom>
-            <a:solidFill>
-              <a:schemeClr val="bg1"/>
-            </a:solidFill>
-            <a:ln>
-              <a:solidFill>
-                <a:schemeClr val="bg1"/>
-              </a:solidFill>
-            </a:ln>
-          </p:spPr>
-          <p:style>
-            <a:lnRef idx="2">
-              <a:schemeClr val="accent1">
-                <a:shade val="50000"/>
-              </a:schemeClr>
-            </a:lnRef>
-            <a:fillRef idx="1">
-              <a:schemeClr val="accent1"/>
-            </a:fillRef>
-            <a:effectRef idx="0">
-              <a:schemeClr val="accent1"/>
-            </a:effectRef>
-            <a:fontRef idx="minor">
-              <a:schemeClr val="lt1"/>
-            </a:fontRef>
-          </p:style>
-          <p:txBody>
-            <a:bodyPr rtlCol="0" anchor="ctr"/>
-            <a:lstStyle/>
-            <a:p>
-              <a:pPr algn="ctr"/>
-              <a:r>
-                <a:rPr lang="en-US" b="1" dirty="0">
-                  <a:solidFill>
-                    <a:schemeClr val="tx1"/>
-                  </a:solidFill>
-                </a:rPr>
-                <a:t>B)</a:t>
-              </a:r>
-            </a:p>
-          </p:txBody>
-        </p:sp>
-        <p:sp>
-          <p:nvSpPr>
-            <p:cNvPr id="23" name="Rectangle 22">
-              <a:extLst>
-                <a:ext uri="{FF2B5EF4-FFF2-40B4-BE49-F238E27FC236}">
-                  <a16:creationId xmlns:a16="http://schemas.microsoft.com/office/drawing/2014/main" id="{C1AA1F1E-C206-4FC0-847F-57FEBF404054}"/>
-                </a:ext>
-              </a:extLst>
-            </p:cNvPr>
-            <p:cNvSpPr/>
-            <p:nvPr/>
-          </p:nvSpPr>
-          <p:spPr>
-            <a:xfrm>
-              <a:off x="1144242" y="6932034"/>
-              <a:ext cx="445317" cy="408709"/>
-            </a:xfrm>
-            <a:prstGeom prst="rect">
-              <a:avLst/>
-            </a:prstGeom>
-            <a:solidFill>
-              <a:schemeClr val="bg1"/>
-            </a:solidFill>
-            <a:ln>
-              <a:solidFill>
-                <a:schemeClr val="bg1"/>
-              </a:solidFill>
-            </a:ln>
-          </p:spPr>
-          <p:style>
-            <a:lnRef idx="2">
-              <a:schemeClr val="accent1">
-                <a:shade val="50000"/>
-              </a:schemeClr>
-            </a:lnRef>
-            <a:fillRef idx="1">
-              <a:schemeClr val="accent1"/>
-            </a:fillRef>
-            <a:effectRef idx="0">
-              <a:schemeClr val="accent1"/>
-            </a:effectRef>
-            <a:fontRef idx="minor">
-              <a:schemeClr val="lt1"/>
-            </a:fontRef>
-          </p:style>
-          <p:txBody>
-            <a:bodyPr rtlCol="0" anchor="ctr"/>
-            <a:lstStyle/>
-            <a:p>
-              <a:pPr algn="ctr"/>
-              <a:r>
-                <a:rPr lang="en-US" b="1" dirty="0">
-                  <a:solidFill>
-                    <a:schemeClr val="tx1"/>
-                  </a:solidFill>
-                </a:rPr>
-                <a:t>C)</a:t>
-              </a:r>
-            </a:p>
-          </p:txBody>
-        </p:sp>
-      </p:grpSp>
+          <a:prstGeom prst="rect">
+            <a:avLst/>
+          </a:prstGeom>
+        </p:spPr>
+      </p:pic>
+      <p:pic>
+        <p:nvPicPr>
+          <p:cNvPr id="5" name="Picture 4" descr="Chart&#10;&#10;Description automatically generated">
+            <a:extLst>
+              <a:ext uri="{FF2B5EF4-FFF2-40B4-BE49-F238E27FC236}">
+                <a16:creationId xmlns:a16="http://schemas.microsoft.com/office/drawing/2014/main" id="{68DD28D9-72A8-4383-A09B-7A49E86181C9}"/>
+              </a:ext>
+            </a:extLst>
+          </p:cNvPr>
+          <p:cNvPicPr>
+            <a:picLocks noChangeAspect="1"/>
+          </p:cNvPicPr>
+          <p:nvPr/>
+        </p:nvPicPr>
+        <p:blipFill>
+          <a:blip r:embed="rId3">
+            <a:extLst>
+              <a:ext uri="{28A0092B-C50C-407E-A947-70E740481C1C}">
+                <a14:useLocalDpi xmlns:a14="http://schemas.microsoft.com/office/drawing/2010/main" val="0"/>
+              </a:ext>
+            </a:extLst>
+          </a:blip>
+          <a:stretch>
+            <a:fillRect/>
+          </a:stretch>
+        </p:blipFill>
+        <p:spPr>
+          <a:xfrm>
+            <a:off x="5066900" y="3200393"/>
+            <a:ext cx="4572009" cy="3657607"/>
+          </a:xfrm>
+          <a:prstGeom prst="rect">
+            <a:avLst/>
+          </a:prstGeom>
+        </p:spPr>
+      </p:pic>
+      <p:pic>
+        <p:nvPicPr>
+          <p:cNvPr id="7" name="Picture 6" descr="Chart&#10;&#10;Description automatically generated">
+            <a:extLst>
+              <a:ext uri="{FF2B5EF4-FFF2-40B4-BE49-F238E27FC236}">
+                <a16:creationId xmlns:a16="http://schemas.microsoft.com/office/drawing/2014/main" id="{A3C280E4-4F84-482F-85A8-5892E4A9B68A}"/>
+              </a:ext>
+            </a:extLst>
+          </p:cNvPr>
+          <p:cNvPicPr>
+            <a:picLocks noChangeAspect="1"/>
+          </p:cNvPicPr>
+          <p:nvPr/>
+        </p:nvPicPr>
+        <p:blipFill>
+          <a:blip r:embed="rId4">
+            <a:extLst>
+              <a:ext uri="{28A0092B-C50C-407E-A947-70E740481C1C}">
+                <a14:useLocalDpi xmlns:a14="http://schemas.microsoft.com/office/drawing/2010/main" val="0"/>
+              </a:ext>
+            </a:extLst>
+          </a:blip>
+          <a:stretch>
+            <a:fillRect/>
+          </a:stretch>
+        </p:blipFill>
+        <p:spPr>
+          <a:xfrm>
+            <a:off x="6933406" y="1900196"/>
+            <a:ext cx="4572009" cy="3657607"/>
+          </a:xfrm>
+          <a:prstGeom prst="rect">
+            <a:avLst/>
+          </a:prstGeom>
+        </p:spPr>
+      </p:pic>
     </p:spTree>
     <p:extLst>
       <p:ext uri="{BB962C8B-B14F-4D97-AF65-F5344CB8AC3E}">
-        <p14:creationId xmlns:p14="http://schemas.microsoft.com/office/powerpoint/2010/main" val="1241487079"/>
+        <p14:creationId xmlns:p14="http://schemas.microsoft.com/office/powerpoint/2010/main" val="749053936"/>
       </p:ext>
     </p:extLst>
   </p:cSld>
@@ -14563,19 +16484,19 @@
       </p:grpSpPr>
       <p:pic>
         <p:nvPicPr>
-          <p:cNvPr id="1026" name="Picture 2">
+          <p:cNvPr id="5" name="Picture 4" descr="Chart, box and whisker chart&#10;&#10;Description automatically generated">
             <a:extLst>
               <a:ext uri="{FF2B5EF4-FFF2-40B4-BE49-F238E27FC236}">
-                <a16:creationId xmlns:a16="http://schemas.microsoft.com/office/drawing/2014/main" id="{6D9FBAB6-C9A2-4E7D-885E-7DC59623C84B}"/>
+                <a16:creationId xmlns:a16="http://schemas.microsoft.com/office/drawing/2014/main" id="{A7FA2606-85B8-40AB-B894-432973F43214}"/>
               </a:ext>
             </a:extLst>
           </p:cNvPr>
           <p:cNvPicPr>
-            <a:picLocks noChangeAspect="1" noChangeArrowheads="1"/>
+            <a:picLocks noChangeAspect="1"/>
           </p:cNvPicPr>
           <p:nvPr/>
         </p:nvPicPr>
-        <p:blipFill>
+        <p:blipFill rotWithShape="1">
           <a:blip r:embed="rId2">
             <a:extLst>
               <a:ext uri="{28A0092B-C50C-407E-A947-70E740481C1C}">
@@ -14583,35 +16504,739 @@
               </a:ext>
             </a:extLst>
           </a:blip>
-          <a:srcRect/>
-          <a:stretch>
-            <a:fillRect/>
-          </a:stretch>
+          <a:srcRect t="9446" r="12199"/>
+          <a:stretch/>
         </p:blipFill>
-        <p:spPr bwMode="auto">
+        <p:spPr>
           <a:xfrm>
-            <a:off x="3148013" y="528638"/>
-            <a:ext cx="5895975" cy="5800725"/>
+            <a:off x="9730" y="3803516"/>
+            <a:ext cx="12182100" cy="6084895"/>
           </a:xfrm>
           <a:prstGeom prst="rect">
             <a:avLst/>
           </a:prstGeom>
-          <a:noFill/>
-          <a:extLst>
-            <a:ext uri="{909E8E84-426E-40DD-AFC4-6F175D3DCCD1}">
-              <a14:hiddenFill xmlns:a14="http://schemas.microsoft.com/office/drawing/2010/main">
-                <a:solidFill>
-                  <a:srgbClr val="FFFFFF"/>
-                </a:solidFill>
-              </a14:hiddenFill>
-            </a:ext>
-          </a:extLst>
         </p:spPr>
       </p:pic>
+      <p:pic>
+        <p:nvPicPr>
+          <p:cNvPr id="16" name="Picture 15" descr="Chart&#10;&#10;Description automatically generated">
+            <a:extLst>
+              <a:ext uri="{FF2B5EF4-FFF2-40B4-BE49-F238E27FC236}">
+                <a16:creationId xmlns:a16="http://schemas.microsoft.com/office/drawing/2014/main" id="{4BACFF76-AF23-467A-8578-45335FA22BD5}"/>
+              </a:ext>
+            </a:extLst>
+          </p:cNvPr>
+          <p:cNvPicPr>
+            <a:picLocks noChangeAspect="1"/>
+          </p:cNvPicPr>
+          <p:nvPr/>
+        </p:nvPicPr>
+        <p:blipFill rotWithShape="1">
+          <a:blip r:embed="rId3">
+            <a:extLst>
+              <a:ext uri="{28A0092B-C50C-407E-A947-70E740481C1C}">
+                <a14:useLocalDpi xmlns:a14="http://schemas.microsoft.com/office/drawing/2010/main" val="0"/>
+              </a:ext>
+            </a:extLst>
+          </a:blip>
+          <a:srcRect r="24338"/>
+          <a:stretch/>
+        </p:blipFill>
+        <p:spPr>
+          <a:xfrm>
+            <a:off x="6202420" y="368277"/>
+            <a:ext cx="3459293" cy="3657607"/>
+          </a:xfrm>
+          <a:prstGeom prst="rect">
+            <a:avLst/>
+          </a:prstGeom>
+        </p:spPr>
+      </p:pic>
+      <p:pic>
+        <p:nvPicPr>
+          <p:cNvPr id="6" name="Picture 5" descr="Chart, box and whisker chart&#10;&#10;Description automatically generated">
+            <a:extLst>
+              <a:ext uri="{FF2B5EF4-FFF2-40B4-BE49-F238E27FC236}">
+                <a16:creationId xmlns:a16="http://schemas.microsoft.com/office/drawing/2014/main" id="{C23EAF1A-3DD7-43EC-882A-0DA93E9901CC}"/>
+              </a:ext>
+            </a:extLst>
+          </p:cNvPr>
+          <p:cNvPicPr>
+            <a:picLocks noChangeAspect="1"/>
+          </p:cNvPicPr>
+          <p:nvPr/>
+        </p:nvPicPr>
+        <p:blipFill rotWithShape="1">
+          <a:blip r:embed="rId4">
+            <a:extLst>
+              <a:ext uri="{28A0092B-C50C-407E-A947-70E740481C1C}">
+                <a14:useLocalDpi xmlns:a14="http://schemas.microsoft.com/office/drawing/2010/main" val="0"/>
+              </a:ext>
+            </a:extLst>
+          </a:blip>
+          <a:srcRect l="4432" t="447" r="74716" b="91172"/>
+          <a:stretch/>
+        </p:blipFill>
+        <p:spPr>
+          <a:xfrm>
+            <a:off x="381000" y="-2004493"/>
+            <a:ext cx="2542309" cy="408709"/>
+          </a:xfrm>
+          <a:prstGeom prst="rect">
+            <a:avLst/>
+          </a:prstGeom>
+        </p:spPr>
+      </p:pic>
+      <p:pic>
+        <p:nvPicPr>
+          <p:cNvPr id="7" name="Picture 6" descr="Chart, box and whisker chart&#10;&#10;Description automatically generated">
+            <a:extLst>
+              <a:ext uri="{FF2B5EF4-FFF2-40B4-BE49-F238E27FC236}">
+                <a16:creationId xmlns:a16="http://schemas.microsoft.com/office/drawing/2014/main" id="{E2E36872-957D-482B-8138-3D3A70EC8D11}"/>
+              </a:ext>
+            </a:extLst>
+          </p:cNvPr>
+          <p:cNvPicPr>
+            <a:picLocks noChangeAspect="1"/>
+          </p:cNvPicPr>
+          <p:nvPr/>
+        </p:nvPicPr>
+        <p:blipFill rotWithShape="1">
+          <a:blip r:embed="rId4">
+            <a:extLst>
+              <a:ext uri="{28A0092B-C50C-407E-A947-70E740481C1C}">
+                <a14:useLocalDpi xmlns:a14="http://schemas.microsoft.com/office/drawing/2010/main" val="0"/>
+              </a:ext>
+            </a:extLst>
+          </a:blip>
+          <a:srcRect l="89489" t="40504" b="37479"/>
+          <a:stretch/>
+        </p:blipFill>
+        <p:spPr>
+          <a:xfrm>
+            <a:off x="10806546" y="-2004493"/>
+            <a:ext cx="1281544" cy="1073727"/>
+          </a:xfrm>
+          <a:prstGeom prst="rect">
+            <a:avLst/>
+          </a:prstGeom>
+        </p:spPr>
+      </p:pic>
+      <p:pic>
+        <p:nvPicPr>
+          <p:cNvPr id="8" name="Picture 7" descr="Chart, box and whisker chart&#10;&#10;Description automatically generated">
+            <a:extLst>
+              <a:ext uri="{FF2B5EF4-FFF2-40B4-BE49-F238E27FC236}">
+                <a16:creationId xmlns:a16="http://schemas.microsoft.com/office/drawing/2014/main" id="{DE1CE60D-4E6D-4E5C-AA29-E06E4DF55458}"/>
+              </a:ext>
+            </a:extLst>
+          </p:cNvPr>
+          <p:cNvPicPr>
+            <a:picLocks noChangeAspect="1"/>
+          </p:cNvPicPr>
+          <p:nvPr/>
+        </p:nvPicPr>
+        <p:blipFill rotWithShape="1">
+          <a:blip r:embed="rId4">
+            <a:extLst>
+              <a:ext uri="{28A0092B-C50C-407E-A947-70E740481C1C}">
+                <a14:useLocalDpi xmlns:a14="http://schemas.microsoft.com/office/drawing/2010/main" val="0"/>
+              </a:ext>
+            </a:extLst>
+          </a:blip>
+          <a:srcRect l="25227" t="447" r="53920" b="91172"/>
+          <a:stretch/>
+        </p:blipFill>
+        <p:spPr>
+          <a:xfrm>
+            <a:off x="3051464" y="-2004494"/>
+            <a:ext cx="2542309" cy="408709"/>
+          </a:xfrm>
+          <a:prstGeom prst="rect">
+            <a:avLst/>
+          </a:prstGeom>
+        </p:spPr>
+      </p:pic>
+      <p:pic>
+        <p:nvPicPr>
+          <p:cNvPr id="9" name="Picture 8" descr="Chart, box and whisker chart&#10;&#10;Description automatically generated">
+            <a:extLst>
+              <a:ext uri="{FF2B5EF4-FFF2-40B4-BE49-F238E27FC236}">
+                <a16:creationId xmlns:a16="http://schemas.microsoft.com/office/drawing/2014/main" id="{676C7B85-CA21-425D-A63A-5E0BB77CF4F3}"/>
+              </a:ext>
+            </a:extLst>
+          </p:cNvPr>
+          <p:cNvPicPr>
+            <a:picLocks noChangeAspect="1"/>
+          </p:cNvPicPr>
+          <p:nvPr/>
+        </p:nvPicPr>
+        <p:blipFill rotWithShape="1">
+          <a:blip r:embed="rId4">
+            <a:extLst>
+              <a:ext uri="{28A0092B-C50C-407E-A947-70E740481C1C}">
+                <a14:useLocalDpi xmlns:a14="http://schemas.microsoft.com/office/drawing/2010/main" val="0"/>
+              </a:ext>
+            </a:extLst>
+          </a:blip>
+          <a:srcRect l="46250" t="447" r="32841" b="91172"/>
+          <a:stretch/>
+        </p:blipFill>
+        <p:spPr>
+          <a:xfrm>
+            <a:off x="3283526" y="-1076239"/>
+            <a:ext cx="2549237" cy="408709"/>
+          </a:xfrm>
+          <a:prstGeom prst="rect">
+            <a:avLst/>
+          </a:prstGeom>
+        </p:spPr>
+      </p:pic>
+      <p:pic>
+        <p:nvPicPr>
+          <p:cNvPr id="10" name="Picture 9" descr="Chart, box and whisker chart&#10;&#10;Description automatically generated">
+            <a:extLst>
+              <a:ext uri="{FF2B5EF4-FFF2-40B4-BE49-F238E27FC236}">
+                <a16:creationId xmlns:a16="http://schemas.microsoft.com/office/drawing/2014/main" id="{14714280-7D6C-4E9D-A1AD-9D46CE75F6AF}"/>
+              </a:ext>
+            </a:extLst>
+          </p:cNvPr>
+          <p:cNvPicPr>
+            <a:picLocks noChangeAspect="1"/>
+          </p:cNvPicPr>
+          <p:nvPr/>
+        </p:nvPicPr>
+        <p:blipFill rotWithShape="1">
+          <a:blip r:embed="rId4">
+            <a:extLst>
+              <a:ext uri="{28A0092B-C50C-407E-A947-70E740481C1C}">
+                <a14:useLocalDpi xmlns:a14="http://schemas.microsoft.com/office/drawing/2010/main" val="0"/>
+              </a:ext>
+            </a:extLst>
+          </a:blip>
+          <a:srcRect l="67216" t="1158" r="11875" b="91172"/>
+          <a:stretch/>
+        </p:blipFill>
+        <p:spPr>
+          <a:xfrm>
+            <a:off x="6359239" y="-1076239"/>
+            <a:ext cx="2549237" cy="374072"/>
+          </a:xfrm>
+          <a:prstGeom prst="rect">
+            <a:avLst/>
+          </a:prstGeom>
+        </p:spPr>
+      </p:pic>
+      <p:pic>
+        <p:nvPicPr>
+          <p:cNvPr id="11" name="Picture 10" descr="Chart, box and whisker chart&#10;&#10;Description automatically generated">
+            <a:extLst>
+              <a:ext uri="{FF2B5EF4-FFF2-40B4-BE49-F238E27FC236}">
+                <a16:creationId xmlns:a16="http://schemas.microsoft.com/office/drawing/2014/main" id="{1CBBE543-FCCD-4408-A973-7AD7B69F1A4F}"/>
+              </a:ext>
+            </a:extLst>
+          </p:cNvPr>
+          <p:cNvPicPr>
+            <a:picLocks noChangeAspect="1"/>
+          </p:cNvPicPr>
+          <p:nvPr/>
+        </p:nvPicPr>
+        <p:blipFill rotWithShape="1">
+          <a:blip r:embed="rId4">
+            <a:extLst>
+              <a:ext uri="{28A0092B-C50C-407E-A947-70E740481C1C}">
+                <a14:useLocalDpi xmlns:a14="http://schemas.microsoft.com/office/drawing/2010/main" val="0"/>
+              </a:ext>
+            </a:extLst>
+          </a:blip>
+          <a:srcRect l="67216" t="1158" r="11875" b="91172"/>
+          <a:stretch/>
+        </p:blipFill>
+        <p:spPr>
+          <a:xfrm>
+            <a:off x="9486609" y="35260"/>
+            <a:ext cx="2549237" cy="374072"/>
+          </a:xfrm>
+          <a:prstGeom prst="rect">
+            <a:avLst/>
+          </a:prstGeom>
+        </p:spPr>
+      </p:pic>
+      <p:pic>
+        <p:nvPicPr>
+          <p:cNvPr id="12" name="Picture 11" descr="Chart, box and whisker chart&#10;&#10;Description automatically generated">
+            <a:extLst>
+              <a:ext uri="{FF2B5EF4-FFF2-40B4-BE49-F238E27FC236}">
+                <a16:creationId xmlns:a16="http://schemas.microsoft.com/office/drawing/2014/main" id="{956F711E-B424-49D3-A13C-2C450514684E}"/>
+              </a:ext>
+            </a:extLst>
+          </p:cNvPr>
+          <p:cNvPicPr>
+            <a:picLocks noChangeAspect="1"/>
+          </p:cNvPicPr>
+          <p:nvPr/>
+        </p:nvPicPr>
+        <p:blipFill rotWithShape="1">
+          <a:blip r:embed="rId4">
+            <a:extLst>
+              <a:ext uri="{28A0092B-C50C-407E-A947-70E740481C1C}">
+                <a14:useLocalDpi xmlns:a14="http://schemas.microsoft.com/office/drawing/2010/main" val="0"/>
+              </a:ext>
+            </a:extLst>
+          </a:blip>
+          <a:srcRect l="46250" t="447" r="32841" b="91172"/>
+          <a:stretch/>
+        </p:blipFill>
+        <p:spPr>
+          <a:xfrm>
+            <a:off x="6705541" y="17942"/>
+            <a:ext cx="2549237" cy="408709"/>
+          </a:xfrm>
+          <a:prstGeom prst="rect">
+            <a:avLst/>
+          </a:prstGeom>
+        </p:spPr>
+      </p:pic>
+      <p:pic>
+        <p:nvPicPr>
+          <p:cNvPr id="13" name="Picture 12" descr="Chart, box and whisker chart&#10;&#10;Description automatically generated">
+            <a:extLst>
+              <a:ext uri="{FF2B5EF4-FFF2-40B4-BE49-F238E27FC236}">
+                <a16:creationId xmlns:a16="http://schemas.microsoft.com/office/drawing/2014/main" id="{6DBC0EDD-A65E-4A93-9FD6-DE3B0A6DA04B}"/>
+              </a:ext>
+            </a:extLst>
+          </p:cNvPr>
+          <p:cNvPicPr>
+            <a:picLocks noChangeAspect="1"/>
+          </p:cNvPicPr>
+          <p:nvPr/>
+        </p:nvPicPr>
+        <p:blipFill rotWithShape="1">
+          <a:blip r:embed="rId4">
+            <a:extLst>
+              <a:ext uri="{28A0092B-C50C-407E-A947-70E740481C1C}">
+                <a14:useLocalDpi xmlns:a14="http://schemas.microsoft.com/office/drawing/2010/main" val="0"/>
+              </a:ext>
+            </a:extLst>
+          </a:blip>
+          <a:srcRect l="25227" t="447" r="53920" b="91172"/>
+          <a:stretch/>
+        </p:blipFill>
+        <p:spPr>
+          <a:xfrm>
+            <a:off x="3910474" y="17942"/>
+            <a:ext cx="2542309" cy="408709"/>
+          </a:xfrm>
+          <a:prstGeom prst="rect">
+            <a:avLst/>
+          </a:prstGeom>
+        </p:spPr>
+      </p:pic>
+      <p:pic>
+        <p:nvPicPr>
+          <p:cNvPr id="14" name="Picture 13" descr="Chart, box and whisker chart&#10;&#10;Description automatically generated">
+            <a:extLst>
+              <a:ext uri="{FF2B5EF4-FFF2-40B4-BE49-F238E27FC236}">
+                <a16:creationId xmlns:a16="http://schemas.microsoft.com/office/drawing/2014/main" id="{5FF5AA67-4A83-4F12-9279-D9B1F7BB23D2}"/>
+              </a:ext>
+            </a:extLst>
+          </p:cNvPr>
+          <p:cNvPicPr>
+            <a:picLocks noChangeAspect="1"/>
+          </p:cNvPicPr>
+          <p:nvPr/>
+        </p:nvPicPr>
+        <p:blipFill rotWithShape="1">
+          <a:blip r:embed="rId4">
+            <a:extLst>
+              <a:ext uri="{28A0092B-C50C-407E-A947-70E740481C1C}">
+                <a14:useLocalDpi xmlns:a14="http://schemas.microsoft.com/office/drawing/2010/main" val="0"/>
+              </a:ext>
+            </a:extLst>
+          </a:blip>
+          <a:srcRect l="4432" t="447" r="74716" b="91172"/>
+          <a:stretch/>
+        </p:blipFill>
+        <p:spPr>
+          <a:xfrm>
+            <a:off x="1039702" y="17942"/>
+            <a:ext cx="2542309" cy="408709"/>
+          </a:xfrm>
+          <a:prstGeom prst="rect">
+            <a:avLst/>
+          </a:prstGeom>
+        </p:spPr>
+      </p:pic>
+      <p:sp>
+        <p:nvSpPr>
+          <p:cNvPr id="15" name="Rectangle 14">
+            <a:extLst>
+              <a:ext uri="{FF2B5EF4-FFF2-40B4-BE49-F238E27FC236}">
+                <a16:creationId xmlns:a16="http://schemas.microsoft.com/office/drawing/2014/main" id="{ACE869D7-7F0A-4583-8DC5-9ED0C0F7548B}"/>
+              </a:ext>
+            </a:extLst>
+          </p:cNvPr>
+          <p:cNvSpPr/>
+          <p:nvPr/>
+        </p:nvSpPr>
+        <p:spPr>
+          <a:xfrm>
+            <a:off x="70056" y="78207"/>
+            <a:ext cx="445317" cy="408709"/>
+          </a:xfrm>
+          <a:prstGeom prst="rect">
+            <a:avLst/>
+          </a:prstGeom>
+          <a:solidFill>
+            <a:schemeClr val="bg1"/>
+          </a:solidFill>
+          <a:ln>
+            <a:solidFill>
+              <a:schemeClr val="bg1"/>
+            </a:solidFill>
+          </a:ln>
+        </p:spPr>
+        <p:style>
+          <a:lnRef idx="2">
+            <a:schemeClr val="accent1">
+              <a:shade val="50000"/>
+            </a:schemeClr>
+          </a:lnRef>
+          <a:fillRef idx="1">
+            <a:schemeClr val="accent1"/>
+          </a:fillRef>
+          <a:effectRef idx="0">
+            <a:schemeClr val="accent1"/>
+          </a:effectRef>
+          <a:fontRef idx="minor">
+            <a:schemeClr val="lt1"/>
+          </a:fontRef>
+        </p:style>
+        <p:txBody>
+          <a:bodyPr rtlCol="0" anchor="ctr"/>
+          <a:lstStyle/>
+          <a:p>
+            <a:pPr algn="ctr"/>
+            <a:r>
+              <a:rPr lang="en-US" b="1" dirty="0">
+                <a:solidFill>
+                  <a:schemeClr val="tx1"/>
+                </a:solidFill>
+              </a:rPr>
+              <a:t>A)</a:t>
+            </a:r>
+          </a:p>
+        </p:txBody>
+      </p:sp>
+      <p:sp>
+        <p:nvSpPr>
+          <p:cNvPr id="17" name="Rectangle 16">
+            <a:extLst>
+              <a:ext uri="{FF2B5EF4-FFF2-40B4-BE49-F238E27FC236}">
+                <a16:creationId xmlns:a16="http://schemas.microsoft.com/office/drawing/2014/main" id="{CB0A29A4-455C-4EDD-B813-7E5F38E14554}"/>
+              </a:ext>
+            </a:extLst>
+          </p:cNvPr>
+          <p:cNvSpPr/>
+          <p:nvPr/>
+        </p:nvSpPr>
+        <p:spPr>
+          <a:xfrm>
+            <a:off x="1579553" y="3812220"/>
+            <a:ext cx="9626138" cy="250918"/>
+          </a:xfrm>
+          <a:prstGeom prst="rect">
+            <a:avLst/>
+          </a:prstGeom>
+          <a:solidFill>
+            <a:schemeClr val="bg1"/>
+          </a:solidFill>
+          <a:ln>
+            <a:solidFill>
+              <a:schemeClr val="bg1"/>
+            </a:solidFill>
+          </a:ln>
+        </p:spPr>
+        <p:style>
+          <a:lnRef idx="2">
+            <a:schemeClr val="accent1">
+              <a:shade val="50000"/>
+            </a:schemeClr>
+          </a:lnRef>
+          <a:fillRef idx="1">
+            <a:schemeClr val="accent1"/>
+          </a:fillRef>
+          <a:effectRef idx="0">
+            <a:schemeClr val="accent1"/>
+          </a:effectRef>
+          <a:fontRef idx="minor">
+            <a:schemeClr val="lt1"/>
+          </a:fontRef>
+        </p:style>
+        <p:txBody>
+          <a:bodyPr rtlCol="0" anchor="ctr"/>
+          <a:lstStyle/>
+          <a:p>
+            <a:pPr algn="ctr"/>
+            <a:r>
+              <a:rPr lang="en-US" sz="1600" dirty="0">
+                <a:solidFill>
+                  <a:schemeClr val="tx1"/>
+                </a:solidFill>
+              </a:rPr>
+              <a:t>Time (years)</a:t>
+            </a:r>
+          </a:p>
+        </p:txBody>
+      </p:sp>
+      <p:sp>
+        <p:nvSpPr>
+          <p:cNvPr id="18" name="Rectangle 17">
+            <a:extLst>
+              <a:ext uri="{FF2B5EF4-FFF2-40B4-BE49-F238E27FC236}">
+                <a16:creationId xmlns:a16="http://schemas.microsoft.com/office/drawing/2014/main" id="{CC11597A-5C5F-4905-8711-8FB2EC8C64D8}"/>
+              </a:ext>
+            </a:extLst>
+          </p:cNvPr>
+          <p:cNvSpPr/>
+          <p:nvPr/>
+        </p:nvSpPr>
+        <p:spPr>
+          <a:xfrm>
+            <a:off x="7365740" y="3626732"/>
+            <a:ext cx="515389" cy="271549"/>
+          </a:xfrm>
+          <a:prstGeom prst="rect">
+            <a:avLst/>
+          </a:prstGeom>
+          <a:solidFill>
+            <a:schemeClr val="bg1"/>
+          </a:solidFill>
+          <a:ln>
+            <a:solidFill>
+              <a:schemeClr val="bg1"/>
+            </a:solidFill>
+          </a:ln>
+        </p:spPr>
+        <p:style>
+          <a:lnRef idx="2">
+            <a:schemeClr val="accent1">
+              <a:shade val="50000"/>
+            </a:schemeClr>
+          </a:lnRef>
+          <a:fillRef idx="1">
+            <a:schemeClr val="accent1"/>
+          </a:fillRef>
+          <a:effectRef idx="0">
+            <a:schemeClr val="accent1"/>
+          </a:effectRef>
+          <a:fontRef idx="minor">
+            <a:schemeClr val="lt1"/>
+          </a:fontRef>
+        </p:style>
+        <p:txBody>
+          <a:bodyPr rtlCol="0" anchor="ctr"/>
+          <a:lstStyle/>
+          <a:p>
+            <a:pPr algn="ctr"/>
+            <a:r>
+              <a:rPr lang="en-US" sz="1200" dirty="0">
+                <a:solidFill>
+                  <a:schemeClr val="tx1"/>
+                </a:solidFill>
+              </a:rPr>
+              <a:t>25</a:t>
+            </a:r>
+          </a:p>
+        </p:txBody>
+      </p:sp>
+      <p:sp>
+        <p:nvSpPr>
+          <p:cNvPr id="19" name="Rectangle 18">
+            <a:extLst>
+              <a:ext uri="{FF2B5EF4-FFF2-40B4-BE49-F238E27FC236}">
+                <a16:creationId xmlns:a16="http://schemas.microsoft.com/office/drawing/2014/main" id="{AD34CEEF-8CC4-49E7-AA82-1EC78D762BC2}"/>
+              </a:ext>
+            </a:extLst>
+          </p:cNvPr>
+          <p:cNvSpPr/>
+          <p:nvPr/>
+        </p:nvSpPr>
+        <p:spPr>
+          <a:xfrm>
+            <a:off x="8576735" y="3626732"/>
+            <a:ext cx="515389" cy="271549"/>
+          </a:xfrm>
+          <a:prstGeom prst="rect">
+            <a:avLst/>
+          </a:prstGeom>
+          <a:solidFill>
+            <a:schemeClr val="bg1"/>
+          </a:solidFill>
+          <a:ln>
+            <a:solidFill>
+              <a:schemeClr val="bg1"/>
+            </a:solidFill>
+          </a:ln>
+        </p:spPr>
+        <p:style>
+          <a:lnRef idx="2">
+            <a:schemeClr val="accent1">
+              <a:shade val="50000"/>
+            </a:schemeClr>
+          </a:lnRef>
+          <a:fillRef idx="1">
+            <a:schemeClr val="accent1"/>
+          </a:fillRef>
+          <a:effectRef idx="0">
+            <a:schemeClr val="accent1"/>
+          </a:effectRef>
+          <a:fontRef idx="minor">
+            <a:schemeClr val="lt1"/>
+          </a:fontRef>
+        </p:style>
+        <p:txBody>
+          <a:bodyPr rtlCol="0" anchor="ctr"/>
+          <a:lstStyle/>
+          <a:p>
+            <a:pPr algn="ctr"/>
+            <a:r>
+              <a:rPr lang="en-US" sz="1200" dirty="0">
+                <a:solidFill>
+                  <a:schemeClr val="tx1"/>
+                </a:solidFill>
+              </a:rPr>
+              <a:t>75</a:t>
+            </a:r>
+          </a:p>
+        </p:txBody>
+      </p:sp>
+      <p:sp>
+        <p:nvSpPr>
+          <p:cNvPr id="20" name="Rectangle 19">
+            <a:extLst>
+              <a:ext uri="{FF2B5EF4-FFF2-40B4-BE49-F238E27FC236}">
+                <a16:creationId xmlns:a16="http://schemas.microsoft.com/office/drawing/2014/main" id="{379237FD-0218-480D-AA42-9F95B7B167AA}"/>
+              </a:ext>
+            </a:extLst>
+          </p:cNvPr>
+          <p:cNvSpPr/>
+          <p:nvPr/>
+        </p:nvSpPr>
+        <p:spPr>
+          <a:xfrm>
+            <a:off x="9176430" y="3626732"/>
+            <a:ext cx="515389" cy="271549"/>
+          </a:xfrm>
+          <a:prstGeom prst="rect">
+            <a:avLst/>
+          </a:prstGeom>
+          <a:solidFill>
+            <a:schemeClr val="bg1"/>
+          </a:solidFill>
+          <a:ln>
+            <a:solidFill>
+              <a:schemeClr val="bg1"/>
+            </a:solidFill>
+          </a:ln>
+        </p:spPr>
+        <p:style>
+          <a:lnRef idx="2">
+            <a:schemeClr val="accent1">
+              <a:shade val="50000"/>
+            </a:schemeClr>
+          </a:lnRef>
+          <a:fillRef idx="1">
+            <a:schemeClr val="accent1"/>
+          </a:fillRef>
+          <a:effectRef idx="0">
+            <a:schemeClr val="accent1"/>
+          </a:effectRef>
+          <a:fontRef idx="minor">
+            <a:schemeClr val="lt1"/>
+          </a:fontRef>
+        </p:style>
+        <p:txBody>
+          <a:bodyPr rtlCol="0" anchor="ctr"/>
+          <a:lstStyle/>
+          <a:p>
+            <a:pPr algn="ctr"/>
+            <a:r>
+              <a:rPr lang="en-US" sz="1200" dirty="0">
+                <a:solidFill>
+                  <a:schemeClr val="tx1"/>
+                </a:solidFill>
+              </a:rPr>
+              <a:t>100</a:t>
+            </a:r>
+          </a:p>
+        </p:txBody>
+      </p:sp>
+      <p:sp>
+        <p:nvSpPr>
+          <p:cNvPr id="21" name="Rectangle 20">
+            <a:extLst>
+              <a:ext uri="{FF2B5EF4-FFF2-40B4-BE49-F238E27FC236}">
+                <a16:creationId xmlns:a16="http://schemas.microsoft.com/office/drawing/2014/main" id="{15C688FD-1F14-4E94-9385-9F9FB4BD2958}"/>
+              </a:ext>
+            </a:extLst>
+          </p:cNvPr>
+          <p:cNvSpPr/>
+          <p:nvPr/>
+        </p:nvSpPr>
+        <p:spPr>
+          <a:xfrm>
+            <a:off x="7970955" y="3626732"/>
+            <a:ext cx="515389" cy="271549"/>
+          </a:xfrm>
+          <a:prstGeom prst="rect">
+            <a:avLst/>
+          </a:prstGeom>
+          <a:solidFill>
+            <a:schemeClr val="bg1"/>
+          </a:solidFill>
+          <a:ln>
+            <a:solidFill>
+              <a:schemeClr val="bg1"/>
+            </a:solidFill>
+          </a:ln>
+        </p:spPr>
+        <p:style>
+          <a:lnRef idx="2">
+            <a:schemeClr val="accent1">
+              <a:shade val="50000"/>
+            </a:schemeClr>
+          </a:lnRef>
+          <a:fillRef idx="1">
+            <a:schemeClr val="accent1"/>
+          </a:fillRef>
+          <a:effectRef idx="0">
+            <a:schemeClr val="accent1"/>
+          </a:effectRef>
+          <a:fontRef idx="minor">
+            <a:schemeClr val="lt1"/>
+          </a:fontRef>
+        </p:style>
+        <p:txBody>
+          <a:bodyPr rtlCol="0" anchor="ctr"/>
+          <a:lstStyle/>
+          <a:p>
+            <a:pPr algn="ctr"/>
+            <a:r>
+              <a:rPr lang="en-US" sz="1200" dirty="0">
+                <a:solidFill>
+                  <a:schemeClr val="tx1"/>
+                </a:solidFill>
+              </a:rPr>
+              <a:t>50</a:t>
+            </a:r>
+          </a:p>
+        </p:txBody>
+      </p:sp>
     </p:spTree>
     <p:extLst>
       <p:ext uri="{BB962C8B-B14F-4D97-AF65-F5344CB8AC3E}">
-        <p14:creationId xmlns:p14="http://schemas.microsoft.com/office/powerpoint/2010/main" val="278972908"/>
+        <p14:creationId xmlns:p14="http://schemas.microsoft.com/office/powerpoint/2010/main" val="1471852638"/>
       </p:ext>
     </p:extLst>
   </p:cSld>

</xml_diff>